<commit_message>
add random walk try
</commit_message>
<xml_diff>
--- a/paper/figsrc/methods.pptx
+++ b/paper/figsrc/methods.pptx
@@ -107,12 +107,12 @@
   <p:extLst>
     <p:ext uri="{EFAFB233-063F-42B5-8137-9DF3F51BA10A}">
       <p15:sldGuideLst xmlns:p15="http://schemas.microsoft.com/office/powerpoint/2012/main">
-        <p15:guide id="1" orient="horz" pos="2160" userDrawn="1">
+        <p15:guide id="1" orient="horz" pos="2183" userDrawn="1">
           <p15:clr>
             <a:srgbClr val="A4A3A4"/>
           </p15:clr>
         </p15:guide>
-        <p15:guide id="2" pos="3840" userDrawn="1">
+        <p15:guide id="2" pos="3817" userDrawn="1">
           <p15:clr>
             <a:srgbClr val="A4A3A4"/>
           </p15:clr>
@@ -270,7 +270,7 @@
           <a:p>
             <a:fld id="{0D04888F-6EFD-48A7-B0E0-45CFA0D7307F}" type="datetimeFigureOut">
               <a:rPr lang="zh-CN" altLang="en-US" smtClean="0"/>
-              <a:t>2020/11/14</a:t>
+              <a:t>2020/11/15</a:t>
             </a:fld>
             <a:endParaRPr lang="zh-CN" altLang="en-US"/>
           </a:p>
@@ -468,7 +468,7 @@
           <a:p>
             <a:fld id="{0D04888F-6EFD-48A7-B0E0-45CFA0D7307F}" type="datetimeFigureOut">
               <a:rPr lang="zh-CN" altLang="en-US" smtClean="0"/>
-              <a:t>2020/11/14</a:t>
+              <a:t>2020/11/15</a:t>
             </a:fld>
             <a:endParaRPr lang="zh-CN" altLang="en-US"/>
           </a:p>
@@ -676,7 +676,7 @@
           <a:p>
             <a:fld id="{0D04888F-6EFD-48A7-B0E0-45CFA0D7307F}" type="datetimeFigureOut">
               <a:rPr lang="zh-CN" altLang="en-US" smtClean="0"/>
-              <a:t>2020/11/14</a:t>
+              <a:t>2020/11/15</a:t>
             </a:fld>
             <a:endParaRPr lang="zh-CN" altLang="en-US"/>
           </a:p>
@@ -874,7 +874,7 @@
           <a:p>
             <a:fld id="{0D04888F-6EFD-48A7-B0E0-45CFA0D7307F}" type="datetimeFigureOut">
               <a:rPr lang="zh-CN" altLang="en-US" smtClean="0"/>
-              <a:t>2020/11/14</a:t>
+              <a:t>2020/11/15</a:t>
             </a:fld>
             <a:endParaRPr lang="zh-CN" altLang="en-US"/>
           </a:p>
@@ -1149,7 +1149,7 @@
           <a:p>
             <a:fld id="{0D04888F-6EFD-48A7-B0E0-45CFA0D7307F}" type="datetimeFigureOut">
               <a:rPr lang="zh-CN" altLang="en-US" smtClean="0"/>
-              <a:t>2020/11/14</a:t>
+              <a:t>2020/11/15</a:t>
             </a:fld>
             <a:endParaRPr lang="zh-CN" altLang="en-US"/>
           </a:p>
@@ -1414,7 +1414,7 @@
           <a:p>
             <a:fld id="{0D04888F-6EFD-48A7-B0E0-45CFA0D7307F}" type="datetimeFigureOut">
               <a:rPr lang="zh-CN" altLang="en-US" smtClean="0"/>
-              <a:t>2020/11/14</a:t>
+              <a:t>2020/11/15</a:t>
             </a:fld>
             <a:endParaRPr lang="zh-CN" altLang="en-US"/>
           </a:p>
@@ -1826,7 +1826,7 @@
           <a:p>
             <a:fld id="{0D04888F-6EFD-48A7-B0E0-45CFA0D7307F}" type="datetimeFigureOut">
               <a:rPr lang="zh-CN" altLang="en-US" smtClean="0"/>
-              <a:t>2020/11/14</a:t>
+              <a:t>2020/11/15</a:t>
             </a:fld>
             <a:endParaRPr lang="zh-CN" altLang="en-US"/>
           </a:p>
@@ -1967,7 +1967,7 @@
           <a:p>
             <a:fld id="{0D04888F-6EFD-48A7-B0E0-45CFA0D7307F}" type="datetimeFigureOut">
               <a:rPr lang="zh-CN" altLang="en-US" smtClean="0"/>
-              <a:t>2020/11/14</a:t>
+              <a:t>2020/11/15</a:t>
             </a:fld>
             <a:endParaRPr lang="zh-CN" altLang="en-US"/>
           </a:p>
@@ -2080,7 +2080,7 @@
           <a:p>
             <a:fld id="{0D04888F-6EFD-48A7-B0E0-45CFA0D7307F}" type="datetimeFigureOut">
               <a:rPr lang="zh-CN" altLang="en-US" smtClean="0"/>
-              <a:t>2020/11/14</a:t>
+              <a:t>2020/11/15</a:t>
             </a:fld>
             <a:endParaRPr lang="zh-CN" altLang="en-US"/>
           </a:p>
@@ -2391,7 +2391,7 @@
           <a:p>
             <a:fld id="{0D04888F-6EFD-48A7-B0E0-45CFA0D7307F}" type="datetimeFigureOut">
               <a:rPr lang="zh-CN" altLang="en-US" smtClean="0"/>
-              <a:t>2020/11/14</a:t>
+              <a:t>2020/11/15</a:t>
             </a:fld>
             <a:endParaRPr lang="zh-CN" altLang="en-US"/>
           </a:p>
@@ -2679,7 +2679,7 @@
           <a:p>
             <a:fld id="{0D04888F-6EFD-48A7-B0E0-45CFA0D7307F}" type="datetimeFigureOut">
               <a:rPr lang="zh-CN" altLang="en-US" smtClean="0"/>
-              <a:t>2020/11/14</a:t>
+              <a:t>2020/11/15</a:t>
             </a:fld>
             <a:endParaRPr lang="zh-CN" altLang="en-US"/>
           </a:p>
@@ -2920,7 +2920,7 @@
           <a:p>
             <a:fld id="{0D04888F-6EFD-48A7-B0E0-45CFA0D7307F}" type="datetimeFigureOut">
               <a:rPr lang="zh-CN" altLang="en-US" smtClean="0"/>
-              <a:t>2020/11/14</a:t>
+              <a:t>2020/11/15</a:t>
             </a:fld>
             <a:endParaRPr lang="zh-CN" altLang="en-US"/>
           </a:p>
@@ -3337,6 +3337,3133 @@
           <a:chExt cx="0" cy="0"/>
         </a:xfrm>
       </p:grpSpPr>
+      <p:grpSp>
+        <p:nvGrpSpPr>
+          <p:cNvPr id="18" name="组合 17">
+            <a:extLst>
+              <a:ext uri="{FF2B5EF4-FFF2-40B4-BE49-F238E27FC236}">
+                <a16:creationId xmlns:a16="http://schemas.microsoft.com/office/drawing/2014/main" id="{E48B36C6-7C32-4715-A266-D73FCE815F16}"/>
+              </a:ext>
+            </a:extLst>
+          </p:cNvPr>
+          <p:cNvGrpSpPr/>
+          <p:nvPr/>
+        </p:nvGrpSpPr>
+        <p:grpSpPr>
+          <a:xfrm>
+            <a:off x="7790498" y="781685"/>
+            <a:ext cx="949960" cy="859367"/>
+            <a:chOff x="9172258" y="1127125"/>
+            <a:chExt cx="949960" cy="859367"/>
+          </a:xfrm>
+        </p:grpSpPr>
+        <p:sp>
+          <p:nvSpPr>
+            <p:cNvPr id="5" name="椭圆 4">
+              <a:extLst>
+                <a:ext uri="{FF2B5EF4-FFF2-40B4-BE49-F238E27FC236}">
+                  <a16:creationId xmlns:a16="http://schemas.microsoft.com/office/drawing/2014/main" id="{09BB47BD-43E3-4928-B4D4-848D4AE74535}"/>
+                </a:ext>
+              </a:extLst>
+            </p:cNvPr>
+            <p:cNvSpPr>
+              <a:spLocks/>
+            </p:cNvSpPr>
+            <p:nvPr/>
+          </p:nvSpPr>
+          <p:spPr>
+            <a:xfrm>
+              <a:off x="9172258" y="1143212"/>
+              <a:ext cx="949960" cy="843280"/>
+            </a:xfrm>
+            <a:prstGeom prst="ellipse">
+              <a:avLst/>
+            </a:prstGeom>
+            <a:noFill/>
+            <a:ln w="25400">
+              <a:solidFill>
+                <a:srgbClr val="4DAF4A"/>
+              </a:solidFill>
+            </a:ln>
+          </p:spPr>
+          <p:style>
+            <a:lnRef idx="2">
+              <a:schemeClr val="accent1">
+                <a:shade val="50000"/>
+              </a:schemeClr>
+            </a:lnRef>
+            <a:fillRef idx="1">
+              <a:schemeClr val="accent1"/>
+            </a:fillRef>
+            <a:effectRef idx="0">
+              <a:schemeClr val="accent1"/>
+            </a:effectRef>
+            <a:fontRef idx="minor">
+              <a:schemeClr val="lt1"/>
+            </a:fontRef>
+          </p:style>
+          <p:txBody>
+            <a:bodyPr rtlCol="0" anchor="ctr"/>
+            <a:lstStyle/>
+            <a:p>
+              <a:pPr algn="ctr"/>
+              <a:endParaRPr lang="zh-CN" altLang="en-US"/>
+            </a:p>
+          </p:txBody>
+        </p:sp>
+        <p:graphicFrame>
+          <p:nvGraphicFramePr>
+            <p:cNvPr id="12" name="对象 11">
+              <a:extLst>
+                <a:ext uri="{FF2B5EF4-FFF2-40B4-BE49-F238E27FC236}">
+                  <a16:creationId xmlns:a16="http://schemas.microsoft.com/office/drawing/2014/main" id="{1EB5A1FF-97A4-4ED1-B1DC-F84D688F0238}"/>
+                </a:ext>
+              </a:extLst>
+            </p:cNvPr>
+            <p:cNvGraphicFramePr>
+              <a:graphicFrameLocks noChangeAspect="1"/>
+            </p:cNvGraphicFramePr>
+            <p:nvPr>
+              <p:extLst>
+                <p:ext uri="{D42A27DB-BD31-4B8C-83A1-F6EECF244321}">
+                  <p14:modId xmlns:p14="http://schemas.microsoft.com/office/powerpoint/2010/main" val="1577114572"/>
+                </p:ext>
+              </p:extLst>
+            </p:nvPr>
+          </p:nvGraphicFramePr>
+          <p:xfrm>
+            <a:off x="9532938" y="1127125"/>
+            <a:ext cx="228600" cy="279400"/>
+          </p:xfrm>
+          <a:graphic>
+            <a:graphicData uri="http://schemas.openxmlformats.org/presentationml/2006/ole">
+              <mc:AlternateContent xmlns:mc="http://schemas.openxmlformats.org/markup-compatibility/2006">
+                <mc:Choice xmlns:v="urn:schemas-microsoft-com:vml" Requires="v">
+                  <p:oleObj spid="_x0000_s1158" name="Equation" r:id="rId3" imgW="228600" imgH="279360" progId="Equation.DSMT4">
+                    <p:embed/>
+                  </p:oleObj>
+                </mc:Choice>
+                <mc:Fallback>
+                  <p:oleObj name="Equation" r:id="rId3" imgW="228600" imgH="279360" progId="Equation.DSMT4">
+                    <p:embed/>
+                    <p:pic>
+                      <p:nvPicPr>
+                        <p:cNvPr id="0" name=""/>
+                        <p:cNvPicPr/>
+                        <p:nvPr/>
+                      </p:nvPicPr>
+                      <p:blipFill>
+                        <a:blip r:embed="rId4"/>
+                        <a:stretch>
+                          <a:fillRect/>
+                        </a:stretch>
+                      </p:blipFill>
+                      <p:spPr>
+                        <a:xfrm>
+                          <a:off x="9532938" y="1127125"/>
+                          <a:ext cx="228600" cy="279400"/>
+                        </a:xfrm>
+                        <a:prstGeom prst="rect">
+                          <a:avLst/>
+                        </a:prstGeom>
+                      </p:spPr>
+                    </p:pic>
+                  </p:oleObj>
+                </mc:Fallback>
+              </mc:AlternateContent>
+            </a:graphicData>
+          </a:graphic>
+        </p:graphicFrame>
+        <p:graphicFrame>
+          <p:nvGraphicFramePr>
+            <p:cNvPr id="13" name="对象 12">
+              <a:extLst>
+                <a:ext uri="{FF2B5EF4-FFF2-40B4-BE49-F238E27FC236}">
+                  <a16:creationId xmlns:a16="http://schemas.microsoft.com/office/drawing/2014/main" id="{11F12D60-D769-4635-834E-BD62CA0C97C4}"/>
+                </a:ext>
+              </a:extLst>
+            </p:cNvPr>
+            <p:cNvGraphicFramePr>
+              <a:graphicFrameLocks noChangeAspect="1"/>
+            </p:cNvGraphicFramePr>
+            <p:nvPr>
+              <p:extLst>
+                <p:ext uri="{D42A27DB-BD31-4B8C-83A1-F6EECF244321}">
+                  <p14:modId xmlns:p14="http://schemas.microsoft.com/office/powerpoint/2010/main" val="160838127"/>
+                </p:ext>
+              </p:extLst>
+            </p:nvPr>
+          </p:nvGraphicFramePr>
+          <p:xfrm>
+            <a:off x="9564688" y="1470872"/>
+            <a:ext cx="165100" cy="114300"/>
+          </p:xfrm>
+          <a:graphic>
+            <a:graphicData uri="http://schemas.openxmlformats.org/presentationml/2006/ole">
+              <mc:AlternateContent xmlns:mc="http://schemas.openxmlformats.org/markup-compatibility/2006">
+                <mc:Choice xmlns:v="urn:schemas-microsoft-com:vml" Requires="v">
+                  <p:oleObj spid="_x0000_s1159" name="Equation" r:id="rId5" imgW="164880" imgH="114120" progId="Equation.DSMT4">
+                    <p:embed/>
+                  </p:oleObj>
+                </mc:Choice>
+                <mc:Fallback>
+                  <p:oleObj name="Equation" r:id="rId5" imgW="164880" imgH="114120" progId="Equation.DSMT4">
+                    <p:embed/>
+                    <p:pic>
+                      <p:nvPicPr>
+                        <p:cNvPr id="0" name=""/>
+                        <p:cNvPicPr/>
+                        <p:nvPr/>
+                      </p:nvPicPr>
+                      <p:blipFill>
+                        <a:blip r:embed="rId6"/>
+                        <a:stretch>
+                          <a:fillRect/>
+                        </a:stretch>
+                      </p:blipFill>
+                      <p:spPr>
+                        <a:xfrm>
+                          <a:off x="9564688" y="1470872"/>
+                          <a:ext cx="165100" cy="114300"/>
+                        </a:xfrm>
+                        <a:prstGeom prst="rect">
+                          <a:avLst/>
+                        </a:prstGeom>
+                      </p:spPr>
+                    </p:pic>
+                  </p:oleObj>
+                </mc:Fallback>
+              </mc:AlternateContent>
+            </a:graphicData>
+          </a:graphic>
+        </p:graphicFrame>
+        <p:graphicFrame>
+          <p:nvGraphicFramePr>
+            <p:cNvPr id="17" name="对象 16">
+              <a:extLst>
+                <a:ext uri="{FF2B5EF4-FFF2-40B4-BE49-F238E27FC236}">
+                  <a16:creationId xmlns:a16="http://schemas.microsoft.com/office/drawing/2014/main" id="{2D95B63C-64A1-42DF-8F07-4261872DEF0B}"/>
+                </a:ext>
+              </a:extLst>
+            </p:cNvPr>
+            <p:cNvGraphicFramePr>
+              <a:graphicFrameLocks noChangeAspect="1"/>
+            </p:cNvGraphicFramePr>
+            <p:nvPr>
+              <p:extLst>
+                <p:ext uri="{D42A27DB-BD31-4B8C-83A1-F6EECF244321}">
+                  <p14:modId xmlns:p14="http://schemas.microsoft.com/office/powerpoint/2010/main" val="3183622203"/>
+                </p:ext>
+              </p:extLst>
+            </p:nvPr>
+          </p:nvGraphicFramePr>
+          <p:xfrm>
+            <a:off x="9291638" y="1649519"/>
+            <a:ext cx="711200" cy="254000"/>
+          </p:xfrm>
+          <a:graphic>
+            <a:graphicData uri="http://schemas.openxmlformats.org/presentationml/2006/ole">
+              <mc:AlternateContent xmlns:mc="http://schemas.openxmlformats.org/markup-compatibility/2006">
+                <mc:Choice xmlns:v="urn:schemas-microsoft-com:vml" Requires="v">
+                  <p:oleObj spid="_x0000_s1160" name="Equation" r:id="rId7" imgW="711000" imgH="253800" progId="Equation.DSMT4">
+                    <p:embed/>
+                  </p:oleObj>
+                </mc:Choice>
+                <mc:Fallback>
+                  <p:oleObj name="Equation" r:id="rId7" imgW="711000" imgH="253800" progId="Equation.DSMT4">
+                    <p:embed/>
+                    <p:pic>
+                      <p:nvPicPr>
+                        <p:cNvPr id="12" name="对象 11">
+                          <a:extLst>
+                            <a:ext uri="{FF2B5EF4-FFF2-40B4-BE49-F238E27FC236}">
+                              <a16:creationId xmlns:a16="http://schemas.microsoft.com/office/drawing/2014/main" id="{1EB5A1FF-97A4-4ED1-B1DC-F84D688F0238}"/>
+                            </a:ext>
+                          </a:extLst>
+                        </p:cNvPr>
+                        <p:cNvPicPr/>
+                        <p:nvPr/>
+                      </p:nvPicPr>
+                      <p:blipFill>
+                        <a:blip r:embed="rId8"/>
+                        <a:stretch>
+                          <a:fillRect/>
+                        </a:stretch>
+                      </p:blipFill>
+                      <p:spPr>
+                        <a:xfrm>
+                          <a:off x="9291638" y="1649519"/>
+                          <a:ext cx="711200" cy="254000"/>
+                        </a:xfrm>
+                        <a:prstGeom prst="rect">
+                          <a:avLst/>
+                        </a:prstGeom>
+                      </p:spPr>
+                    </p:pic>
+                  </p:oleObj>
+                </mc:Fallback>
+              </mc:AlternateContent>
+            </a:graphicData>
+          </a:graphic>
+        </p:graphicFrame>
+      </p:grpSp>
+      <p:grpSp>
+        <p:nvGrpSpPr>
+          <p:cNvPr id="19" name="组合 18">
+            <a:extLst>
+              <a:ext uri="{FF2B5EF4-FFF2-40B4-BE49-F238E27FC236}">
+                <a16:creationId xmlns:a16="http://schemas.microsoft.com/office/drawing/2014/main" id="{8230391F-5A43-4FB3-8AFC-3365F4D0AFB3}"/>
+              </a:ext>
+            </a:extLst>
+          </p:cNvPr>
+          <p:cNvGrpSpPr/>
+          <p:nvPr/>
+        </p:nvGrpSpPr>
+        <p:grpSpPr>
+          <a:xfrm>
+            <a:off x="7790498" y="2104849"/>
+            <a:ext cx="949960" cy="859367"/>
+            <a:chOff x="9172258" y="1127125"/>
+            <a:chExt cx="949960" cy="859367"/>
+          </a:xfrm>
+        </p:grpSpPr>
+        <p:sp>
+          <p:nvSpPr>
+            <p:cNvPr id="20" name="椭圆 19">
+              <a:extLst>
+                <a:ext uri="{FF2B5EF4-FFF2-40B4-BE49-F238E27FC236}">
+                  <a16:creationId xmlns:a16="http://schemas.microsoft.com/office/drawing/2014/main" id="{2BA595D8-09B5-4C8A-AE5C-614610C28F4D}"/>
+                </a:ext>
+              </a:extLst>
+            </p:cNvPr>
+            <p:cNvSpPr>
+              <a:spLocks/>
+            </p:cNvSpPr>
+            <p:nvPr/>
+          </p:nvSpPr>
+          <p:spPr>
+            <a:xfrm>
+              <a:off x="9172258" y="1143212"/>
+              <a:ext cx="949960" cy="843280"/>
+            </a:xfrm>
+            <a:prstGeom prst="ellipse">
+              <a:avLst/>
+            </a:prstGeom>
+            <a:noFill/>
+            <a:ln w="25400">
+              <a:solidFill>
+                <a:srgbClr val="4DAF4A"/>
+              </a:solidFill>
+            </a:ln>
+          </p:spPr>
+          <p:style>
+            <a:lnRef idx="2">
+              <a:schemeClr val="accent1">
+                <a:shade val="50000"/>
+              </a:schemeClr>
+            </a:lnRef>
+            <a:fillRef idx="1">
+              <a:schemeClr val="accent1"/>
+            </a:fillRef>
+            <a:effectRef idx="0">
+              <a:schemeClr val="accent1"/>
+            </a:effectRef>
+            <a:fontRef idx="minor">
+              <a:schemeClr val="lt1"/>
+            </a:fontRef>
+          </p:style>
+          <p:txBody>
+            <a:bodyPr rtlCol="0" anchor="ctr"/>
+            <a:lstStyle/>
+            <a:p>
+              <a:pPr algn="ctr"/>
+              <a:endParaRPr lang="zh-CN" altLang="en-US"/>
+            </a:p>
+          </p:txBody>
+        </p:sp>
+        <p:graphicFrame>
+          <p:nvGraphicFramePr>
+            <p:cNvPr id="21" name="对象 20">
+              <a:extLst>
+                <a:ext uri="{FF2B5EF4-FFF2-40B4-BE49-F238E27FC236}">
+                  <a16:creationId xmlns:a16="http://schemas.microsoft.com/office/drawing/2014/main" id="{27113579-E04F-4B17-89B7-53E4AFC90AAD}"/>
+                </a:ext>
+              </a:extLst>
+            </p:cNvPr>
+            <p:cNvGraphicFramePr>
+              <a:graphicFrameLocks noChangeAspect="1"/>
+            </p:cNvGraphicFramePr>
+            <p:nvPr>
+              <p:extLst>
+                <p:ext uri="{D42A27DB-BD31-4B8C-83A1-F6EECF244321}">
+                  <p14:modId xmlns:p14="http://schemas.microsoft.com/office/powerpoint/2010/main" val="3122301359"/>
+                </p:ext>
+              </p:extLst>
+            </p:nvPr>
+          </p:nvGraphicFramePr>
+          <p:xfrm>
+            <a:off x="9546273" y="1127125"/>
+            <a:ext cx="203200" cy="279400"/>
+          </p:xfrm>
+          <a:graphic>
+            <a:graphicData uri="http://schemas.openxmlformats.org/presentationml/2006/ole">
+              <mc:AlternateContent xmlns:mc="http://schemas.openxmlformats.org/markup-compatibility/2006">
+                <mc:Choice xmlns:v="urn:schemas-microsoft-com:vml" Requires="v">
+                  <p:oleObj spid="_x0000_s1161" name="Equation" r:id="rId9" imgW="203040" imgH="279360" progId="Equation.DSMT4">
+                    <p:embed/>
+                  </p:oleObj>
+                </mc:Choice>
+                <mc:Fallback>
+                  <p:oleObj name="Equation" r:id="rId9" imgW="203040" imgH="279360" progId="Equation.DSMT4">
+                    <p:embed/>
+                    <p:pic>
+                      <p:nvPicPr>
+                        <p:cNvPr id="12" name="对象 11">
+                          <a:extLst>
+                            <a:ext uri="{FF2B5EF4-FFF2-40B4-BE49-F238E27FC236}">
+                              <a16:creationId xmlns:a16="http://schemas.microsoft.com/office/drawing/2014/main" id="{1EB5A1FF-97A4-4ED1-B1DC-F84D688F0238}"/>
+                            </a:ext>
+                          </a:extLst>
+                        </p:cNvPr>
+                        <p:cNvPicPr/>
+                        <p:nvPr/>
+                      </p:nvPicPr>
+                      <p:blipFill>
+                        <a:blip r:embed="rId10"/>
+                        <a:stretch>
+                          <a:fillRect/>
+                        </a:stretch>
+                      </p:blipFill>
+                      <p:spPr>
+                        <a:xfrm>
+                          <a:off x="9546273" y="1127125"/>
+                          <a:ext cx="203200" cy="279400"/>
+                        </a:xfrm>
+                        <a:prstGeom prst="rect">
+                          <a:avLst/>
+                        </a:prstGeom>
+                      </p:spPr>
+                    </p:pic>
+                  </p:oleObj>
+                </mc:Fallback>
+              </mc:AlternateContent>
+            </a:graphicData>
+          </a:graphic>
+        </p:graphicFrame>
+        <p:graphicFrame>
+          <p:nvGraphicFramePr>
+            <p:cNvPr id="22" name="对象 21">
+              <a:extLst>
+                <a:ext uri="{FF2B5EF4-FFF2-40B4-BE49-F238E27FC236}">
+                  <a16:creationId xmlns:a16="http://schemas.microsoft.com/office/drawing/2014/main" id="{DF1F989E-6FB9-489D-9D51-254F89677AC7}"/>
+                </a:ext>
+              </a:extLst>
+            </p:cNvPr>
+            <p:cNvGraphicFramePr>
+              <a:graphicFrameLocks noChangeAspect="1"/>
+            </p:cNvGraphicFramePr>
+            <p:nvPr>
+              <p:extLst>
+                <p:ext uri="{D42A27DB-BD31-4B8C-83A1-F6EECF244321}">
+                  <p14:modId xmlns:p14="http://schemas.microsoft.com/office/powerpoint/2010/main" val="608094526"/>
+                </p:ext>
+              </p:extLst>
+            </p:nvPr>
+          </p:nvGraphicFramePr>
+          <p:xfrm>
+            <a:off x="9564688" y="1470872"/>
+            <a:ext cx="165100" cy="114300"/>
+          </p:xfrm>
+          <a:graphic>
+            <a:graphicData uri="http://schemas.openxmlformats.org/presentationml/2006/ole">
+              <mc:AlternateContent xmlns:mc="http://schemas.openxmlformats.org/markup-compatibility/2006">
+                <mc:Choice xmlns:v="urn:schemas-microsoft-com:vml" Requires="v">
+                  <p:oleObj spid="_x0000_s1162" name="Equation" r:id="rId11" imgW="164880" imgH="114120" progId="Equation.DSMT4">
+                    <p:embed/>
+                  </p:oleObj>
+                </mc:Choice>
+                <mc:Fallback>
+                  <p:oleObj name="Equation" r:id="rId11" imgW="164880" imgH="114120" progId="Equation.DSMT4">
+                    <p:embed/>
+                    <p:pic>
+                      <p:nvPicPr>
+                        <p:cNvPr id="13" name="对象 12">
+                          <a:extLst>
+                            <a:ext uri="{FF2B5EF4-FFF2-40B4-BE49-F238E27FC236}">
+                              <a16:creationId xmlns:a16="http://schemas.microsoft.com/office/drawing/2014/main" id="{11F12D60-D769-4635-834E-BD62CA0C97C4}"/>
+                            </a:ext>
+                          </a:extLst>
+                        </p:cNvPr>
+                        <p:cNvPicPr/>
+                        <p:nvPr/>
+                      </p:nvPicPr>
+                      <p:blipFill>
+                        <a:blip r:embed="rId12"/>
+                        <a:stretch>
+                          <a:fillRect/>
+                        </a:stretch>
+                      </p:blipFill>
+                      <p:spPr>
+                        <a:xfrm>
+                          <a:off x="9564688" y="1470872"/>
+                          <a:ext cx="165100" cy="114300"/>
+                        </a:xfrm>
+                        <a:prstGeom prst="rect">
+                          <a:avLst/>
+                        </a:prstGeom>
+                      </p:spPr>
+                    </p:pic>
+                  </p:oleObj>
+                </mc:Fallback>
+              </mc:AlternateContent>
+            </a:graphicData>
+          </a:graphic>
+        </p:graphicFrame>
+        <p:graphicFrame>
+          <p:nvGraphicFramePr>
+            <p:cNvPr id="23" name="对象 22">
+              <a:extLst>
+                <a:ext uri="{FF2B5EF4-FFF2-40B4-BE49-F238E27FC236}">
+                  <a16:creationId xmlns:a16="http://schemas.microsoft.com/office/drawing/2014/main" id="{83228B05-3080-4E62-A189-D05A54051D5C}"/>
+                </a:ext>
+              </a:extLst>
+            </p:cNvPr>
+            <p:cNvGraphicFramePr>
+              <a:graphicFrameLocks noChangeAspect="1"/>
+            </p:cNvGraphicFramePr>
+            <p:nvPr>
+              <p:extLst>
+                <p:ext uri="{D42A27DB-BD31-4B8C-83A1-F6EECF244321}">
+                  <p14:modId xmlns:p14="http://schemas.microsoft.com/office/powerpoint/2010/main" val="3535733101"/>
+                </p:ext>
+              </p:extLst>
+            </p:nvPr>
+          </p:nvGraphicFramePr>
+          <p:xfrm>
+            <a:off x="9291638" y="1649519"/>
+            <a:ext cx="711200" cy="254000"/>
+          </p:xfrm>
+          <a:graphic>
+            <a:graphicData uri="http://schemas.openxmlformats.org/presentationml/2006/ole">
+              <mc:AlternateContent xmlns:mc="http://schemas.openxmlformats.org/markup-compatibility/2006">
+                <mc:Choice xmlns:v="urn:schemas-microsoft-com:vml" Requires="v">
+                  <p:oleObj spid="_x0000_s1163" name="Equation" r:id="rId13" imgW="711000" imgH="253800" progId="Equation.DSMT4">
+                    <p:embed/>
+                  </p:oleObj>
+                </mc:Choice>
+                <mc:Fallback>
+                  <p:oleObj name="Equation" r:id="rId13" imgW="711000" imgH="253800" progId="Equation.DSMT4">
+                    <p:embed/>
+                    <p:pic>
+                      <p:nvPicPr>
+                        <p:cNvPr id="17" name="对象 16">
+                          <a:extLst>
+                            <a:ext uri="{FF2B5EF4-FFF2-40B4-BE49-F238E27FC236}">
+                              <a16:creationId xmlns:a16="http://schemas.microsoft.com/office/drawing/2014/main" id="{2D95B63C-64A1-42DF-8F07-4261872DEF0B}"/>
+                            </a:ext>
+                          </a:extLst>
+                        </p:cNvPr>
+                        <p:cNvPicPr/>
+                        <p:nvPr/>
+                      </p:nvPicPr>
+                      <p:blipFill>
+                        <a:blip r:embed="rId8"/>
+                        <a:stretch>
+                          <a:fillRect/>
+                        </a:stretch>
+                      </p:blipFill>
+                      <p:spPr>
+                        <a:xfrm>
+                          <a:off x="9291638" y="1649519"/>
+                          <a:ext cx="711200" cy="254000"/>
+                        </a:xfrm>
+                        <a:prstGeom prst="rect">
+                          <a:avLst/>
+                        </a:prstGeom>
+                      </p:spPr>
+                    </p:pic>
+                  </p:oleObj>
+                </mc:Fallback>
+              </mc:AlternateContent>
+            </a:graphicData>
+          </a:graphic>
+        </p:graphicFrame>
+      </p:grpSp>
+      <p:grpSp>
+        <p:nvGrpSpPr>
+          <p:cNvPr id="29" name="组合 28">
+            <a:extLst>
+              <a:ext uri="{FF2B5EF4-FFF2-40B4-BE49-F238E27FC236}">
+                <a16:creationId xmlns:a16="http://schemas.microsoft.com/office/drawing/2014/main" id="{CF25653E-A2B1-4D22-93A0-D999D08C80E0}"/>
+              </a:ext>
+            </a:extLst>
+          </p:cNvPr>
+          <p:cNvGrpSpPr/>
+          <p:nvPr/>
+        </p:nvGrpSpPr>
+        <p:grpSpPr>
+          <a:xfrm>
+            <a:off x="7790498" y="4735089"/>
+            <a:ext cx="949960" cy="859367"/>
+            <a:chOff x="9172258" y="1127125"/>
+            <a:chExt cx="949960" cy="859367"/>
+          </a:xfrm>
+        </p:grpSpPr>
+        <p:sp>
+          <p:nvSpPr>
+            <p:cNvPr id="30" name="椭圆 29">
+              <a:extLst>
+                <a:ext uri="{FF2B5EF4-FFF2-40B4-BE49-F238E27FC236}">
+                  <a16:creationId xmlns:a16="http://schemas.microsoft.com/office/drawing/2014/main" id="{1B19D9B0-FB81-4268-B05B-B3C69270A4EA}"/>
+                </a:ext>
+              </a:extLst>
+            </p:cNvPr>
+            <p:cNvSpPr>
+              <a:spLocks/>
+            </p:cNvSpPr>
+            <p:nvPr/>
+          </p:nvSpPr>
+          <p:spPr>
+            <a:xfrm>
+              <a:off x="9172258" y="1143212"/>
+              <a:ext cx="949960" cy="843280"/>
+            </a:xfrm>
+            <a:prstGeom prst="ellipse">
+              <a:avLst/>
+            </a:prstGeom>
+            <a:noFill/>
+            <a:ln w="25400">
+              <a:solidFill>
+                <a:srgbClr val="4DAF4A"/>
+              </a:solidFill>
+            </a:ln>
+          </p:spPr>
+          <p:style>
+            <a:lnRef idx="2">
+              <a:schemeClr val="accent1">
+                <a:shade val="50000"/>
+              </a:schemeClr>
+            </a:lnRef>
+            <a:fillRef idx="1">
+              <a:schemeClr val="accent1"/>
+            </a:fillRef>
+            <a:effectRef idx="0">
+              <a:schemeClr val="accent1"/>
+            </a:effectRef>
+            <a:fontRef idx="minor">
+              <a:schemeClr val="lt1"/>
+            </a:fontRef>
+          </p:style>
+          <p:txBody>
+            <a:bodyPr rtlCol="0" anchor="ctr"/>
+            <a:lstStyle/>
+            <a:p>
+              <a:pPr algn="ctr"/>
+              <a:endParaRPr lang="zh-CN" altLang="en-US"/>
+            </a:p>
+          </p:txBody>
+        </p:sp>
+        <p:graphicFrame>
+          <p:nvGraphicFramePr>
+            <p:cNvPr id="31" name="对象 30">
+              <a:extLst>
+                <a:ext uri="{FF2B5EF4-FFF2-40B4-BE49-F238E27FC236}">
+                  <a16:creationId xmlns:a16="http://schemas.microsoft.com/office/drawing/2014/main" id="{A2BAB0E6-B57C-409F-BC42-D7FBD7E68C01}"/>
+                </a:ext>
+              </a:extLst>
+            </p:cNvPr>
+            <p:cNvGraphicFramePr>
+              <a:graphicFrameLocks noChangeAspect="1"/>
+            </p:cNvGraphicFramePr>
+            <p:nvPr>
+              <p:extLst>
+                <p:ext uri="{D42A27DB-BD31-4B8C-83A1-F6EECF244321}">
+                  <p14:modId xmlns:p14="http://schemas.microsoft.com/office/powerpoint/2010/main" val="702765350"/>
+                </p:ext>
+              </p:extLst>
+            </p:nvPr>
+          </p:nvGraphicFramePr>
+          <p:xfrm>
+            <a:off x="9532938" y="1127125"/>
+            <a:ext cx="228600" cy="279400"/>
+          </p:xfrm>
+          <a:graphic>
+            <a:graphicData uri="http://schemas.openxmlformats.org/presentationml/2006/ole">
+              <mc:AlternateContent xmlns:mc="http://schemas.openxmlformats.org/markup-compatibility/2006">
+                <mc:Choice xmlns:v="urn:schemas-microsoft-com:vml" Requires="v">
+                  <p:oleObj spid="_x0000_s1164" name="Equation" r:id="rId14" imgW="228600" imgH="279360" progId="Equation.DSMT4">
+                    <p:embed/>
+                  </p:oleObj>
+                </mc:Choice>
+                <mc:Fallback>
+                  <p:oleObj name="Equation" r:id="rId14" imgW="228600" imgH="279360" progId="Equation.DSMT4">
+                    <p:embed/>
+                    <p:pic>
+                      <p:nvPicPr>
+                        <p:cNvPr id="26" name="对象 25">
+                          <a:extLst>
+                            <a:ext uri="{FF2B5EF4-FFF2-40B4-BE49-F238E27FC236}">
+                              <a16:creationId xmlns:a16="http://schemas.microsoft.com/office/drawing/2014/main" id="{D293552F-3489-4470-91E4-DDA50936E13C}"/>
+                            </a:ext>
+                          </a:extLst>
+                        </p:cNvPr>
+                        <p:cNvPicPr/>
+                        <p:nvPr/>
+                      </p:nvPicPr>
+                      <p:blipFill>
+                        <a:blip r:embed="rId15"/>
+                        <a:stretch>
+                          <a:fillRect/>
+                        </a:stretch>
+                      </p:blipFill>
+                      <p:spPr>
+                        <a:xfrm>
+                          <a:off x="9532938" y="1127125"/>
+                          <a:ext cx="228600" cy="279400"/>
+                        </a:xfrm>
+                        <a:prstGeom prst="rect">
+                          <a:avLst/>
+                        </a:prstGeom>
+                      </p:spPr>
+                    </p:pic>
+                  </p:oleObj>
+                </mc:Fallback>
+              </mc:AlternateContent>
+            </a:graphicData>
+          </a:graphic>
+        </p:graphicFrame>
+        <p:graphicFrame>
+          <p:nvGraphicFramePr>
+            <p:cNvPr id="32" name="对象 31">
+              <a:extLst>
+                <a:ext uri="{FF2B5EF4-FFF2-40B4-BE49-F238E27FC236}">
+                  <a16:creationId xmlns:a16="http://schemas.microsoft.com/office/drawing/2014/main" id="{025656FA-49DE-41D5-961B-8BF065A3EACC}"/>
+                </a:ext>
+              </a:extLst>
+            </p:cNvPr>
+            <p:cNvGraphicFramePr>
+              <a:graphicFrameLocks noChangeAspect="1"/>
+            </p:cNvGraphicFramePr>
+            <p:nvPr>
+              <p:extLst>
+                <p:ext uri="{D42A27DB-BD31-4B8C-83A1-F6EECF244321}">
+                  <p14:modId xmlns:p14="http://schemas.microsoft.com/office/powerpoint/2010/main" val="608094526"/>
+                </p:ext>
+              </p:extLst>
+            </p:nvPr>
+          </p:nvGraphicFramePr>
+          <p:xfrm>
+            <a:off x="9564688" y="1470872"/>
+            <a:ext cx="165100" cy="114300"/>
+          </p:xfrm>
+          <a:graphic>
+            <a:graphicData uri="http://schemas.openxmlformats.org/presentationml/2006/ole">
+              <mc:AlternateContent xmlns:mc="http://schemas.openxmlformats.org/markup-compatibility/2006">
+                <mc:Choice xmlns:v="urn:schemas-microsoft-com:vml" Requires="v">
+                  <p:oleObj spid="_x0000_s1165" name="Equation" r:id="rId16" imgW="164880" imgH="114120" progId="Equation.DSMT4">
+                    <p:embed/>
+                  </p:oleObj>
+                </mc:Choice>
+                <mc:Fallback>
+                  <p:oleObj name="Equation" r:id="rId16" imgW="164880" imgH="114120" progId="Equation.DSMT4">
+                    <p:embed/>
+                    <p:pic>
+                      <p:nvPicPr>
+                        <p:cNvPr id="27" name="对象 26">
+                          <a:extLst>
+                            <a:ext uri="{FF2B5EF4-FFF2-40B4-BE49-F238E27FC236}">
+                              <a16:creationId xmlns:a16="http://schemas.microsoft.com/office/drawing/2014/main" id="{850CCBD3-9740-4B75-AD3C-30DFA56C9B9C}"/>
+                            </a:ext>
+                          </a:extLst>
+                        </p:cNvPr>
+                        <p:cNvPicPr/>
+                        <p:nvPr/>
+                      </p:nvPicPr>
+                      <p:blipFill>
+                        <a:blip r:embed="rId12"/>
+                        <a:stretch>
+                          <a:fillRect/>
+                        </a:stretch>
+                      </p:blipFill>
+                      <p:spPr>
+                        <a:xfrm>
+                          <a:off x="9564688" y="1470872"/>
+                          <a:ext cx="165100" cy="114300"/>
+                        </a:xfrm>
+                        <a:prstGeom prst="rect">
+                          <a:avLst/>
+                        </a:prstGeom>
+                      </p:spPr>
+                    </p:pic>
+                  </p:oleObj>
+                </mc:Fallback>
+              </mc:AlternateContent>
+            </a:graphicData>
+          </a:graphic>
+        </p:graphicFrame>
+        <p:graphicFrame>
+          <p:nvGraphicFramePr>
+            <p:cNvPr id="33" name="对象 32">
+              <a:extLst>
+                <a:ext uri="{FF2B5EF4-FFF2-40B4-BE49-F238E27FC236}">
+                  <a16:creationId xmlns:a16="http://schemas.microsoft.com/office/drawing/2014/main" id="{FCFE96D5-C5B0-428F-BA79-46AB23BEA7E7}"/>
+                </a:ext>
+              </a:extLst>
+            </p:cNvPr>
+            <p:cNvGraphicFramePr>
+              <a:graphicFrameLocks noChangeAspect="1"/>
+            </p:cNvGraphicFramePr>
+            <p:nvPr>
+              <p:extLst>
+                <p:ext uri="{D42A27DB-BD31-4B8C-83A1-F6EECF244321}">
+                  <p14:modId xmlns:p14="http://schemas.microsoft.com/office/powerpoint/2010/main" val="3183622203"/>
+                </p:ext>
+              </p:extLst>
+            </p:nvPr>
+          </p:nvGraphicFramePr>
+          <p:xfrm>
+            <a:off x="9291638" y="1649519"/>
+            <a:ext cx="711200" cy="254000"/>
+          </p:xfrm>
+          <a:graphic>
+            <a:graphicData uri="http://schemas.openxmlformats.org/presentationml/2006/ole">
+              <mc:AlternateContent xmlns:mc="http://schemas.openxmlformats.org/markup-compatibility/2006">
+                <mc:Choice xmlns:v="urn:schemas-microsoft-com:vml" Requires="v">
+                  <p:oleObj spid="_x0000_s1166" name="Equation" r:id="rId17" imgW="711000" imgH="253800" progId="Equation.DSMT4">
+                    <p:embed/>
+                  </p:oleObj>
+                </mc:Choice>
+                <mc:Fallback>
+                  <p:oleObj name="Equation" r:id="rId17" imgW="711000" imgH="253800" progId="Equation.DSMT4">
+                    <p:embed/>
+                    <p:pic>
+                      <p:nvPicPr>
+                        <p:cNvPr id="28" name="对象 27">
+                          <a:extLst>
+                            <a:ext uri="{FF2B5EF4-FFF2-40B4-BE49-F238E27FC236}">
+                              <a16:creationId xmlns:a16="http://schemas.microsoft.com/office/drawing/2014/main" id="{839E67D4-15FF-4DE6-A32B-EDFBAA966642}"/>
+                            </a:ext>
+                          </a:extLst>
+                        </p:cNvPr>
+                        <p:cNvPicPr/>
+                        <p:nvPr/>
+                      </p:nvPicPr>
+                      <p:blipFill>
+                        <a:blip r:embed="rId8"/>
+                        <a:stretch>
+                          <a:fillRect/>
+                        </a:stretch>
+                      </p:blipFill>
+                      <p:spPr>
+                        <a:xfrm>
+                          <a:off x="9291638" y="1649519"/>
+                          <a:ext cx="711200" cy="254000"/>
+                        </a:xfrm>
+                        <a:prstGeom prst="rect">
+                          <a:avLst/>
+                        </a:prstGeom>
+                      </p:spPr>
+                    </p:pic>
+                  </p:oleObj>
+                </mc:Fallback>
+              </mc:AlternateContent>
+            </a:graphicData>
+          </a:graphic>
+        </p:graphicFrame>
+      </p:grpSp>
+      <p:grpSp>
+        <p:nvGrpSpPr>
+          <p:cNvPr id="95" name="组合 94">
+            <a:extLst>
+              <a:ext uri="{FF2B5EF4-FFF2-40B4-BE49-F238E27FC236}">
+                <a16:creationId xmlns:a16="http://schemas.microsoft.com/office/drawing/2014/main" id="{F397B8FD-7A0B-4F56-A7DA-A9DEC82C84C1}"/>
+              </a:ext>
+            </a:extLst>
+          </p:cNvPr>
+          <p:cNvGrpSpPr/>
+          <p:nvPr/>
+        </p:nvGrpSpPr>
+        <p:grpSpPr>
+          <a:xfrm>
+            <a:off x="7790498" y="3428013"/>
+            <a:ext cx="949960" cy="843280"/>
+            <a:chOff x="7790498" y="3428013"/>
+            <a:chExt cx="949960" cy="843280"/>
+          </a:xfrm>
+        </p:grpSpPr>
+        <p:sp>
+          <p:nvSpPr>
+            <p:cNvPr id="25" name="椭圆 24">
+              <a:extLst>
+                <a:ext uri="{FF2B5EF4-FFF2-40B4-BE49-F238E27FC236}">
+                  <a16:creationId xmlns:a16="http://schemas.microsoft.com/office/drawing/2014/main" id="{F8102963-084B-41B8-AC59-66DBBB1E5894}"/>
+                </a:ext>
+              </a:extLst>
+            </p:cNvPr>
+            <p:cNvSpPr>
+              <a:spLocks/>
+            </p:cNvSpPr>
+            <p:nvPr/>
+          </p:nvSpPr>
+          <p:spPr>
+            <a:xfrm>
+              <a:off x="7790498" y="3428013"/>
+              <a:ext cx="949960" cy="843280"/>
+            </a:xfrm>
+            <a:prstGeom prst="ellipse">
+              <a:avLst/>
+            </a:prstGeom>
+            <a:noFill/>
+            <a:ln w="25400">
+              <a:solidFill>
+                <a:srgbClr val="4DAF4A"/>
+              </a:solidFill>
+            </a:ln>
+          </p:spPr>
+          <p:style>
+            <a:lnRef idx="2">
+              <a:schemeClr val="accent1">
+                <a:shade val="50000"/>
+              </a:schemeClr>
+            </a:lnRef>
+            <a:fillRef idx="1">
+              <a:schemeClr val="accent1"/>
+            </a:fillRef>
+            <a:effectRef idx="0">
+              <a:schemeClr val="accent1"/>
+            </a:effectRef>
+            <a:fontRef idx="minor">
+              <a:schemeClr val="lt1"/>
+            </a:fontRef>
+          </p:style>
+          <p:txBody>
+            <a:bodyPr rtlCol="0" anchor="ctr"/>
+            <a:lstStyle/>
+            <a:p>
+              <a:pPr algn="ctr"/>
+              <a:endParaRPr lang="zh-CN" altLang="en-US" dirty="0"/>
+            </a:p>
+          </p:txBody>
+        </p:sp>
+        <p:graphicFrame>
+          <p:nvGraphicFramePr>
+            <p:cNvPr id="27" name="对象 26">
+              <a:extLst>
+                <a:ext uri="{FF2B5EF4-FFF2-40B4-BE49-F238E27FC236}">
+                  <a16:creationId xmlns:a16="http://schemas.microsoft.com/office/drawing/2014/main" id="{850CCBD3-9740-4B75-AD3C-30DFA56C9B9C}"/>
+                </a:ext>
+              </a:extLst>
+            </p:cNvPr>
+            <p:cNvGraphicFramePr>
+              <a:graphicFrameLocks noChangeAspect="1"/>
+            </p:cNvGraphicFramePr>
+            <p:nvPr>
+              <p:extLst>
+                <p:ext uri="{D42A27DB-BD31-4B8C-83A1-F6EECF244321}">
+                  <p14:modId xmlns:p14="http://schemas.microsoft.com/office/powerpoint/2010/main" val="3803903419"/>
+                </p:ext>
+              </p:extLst>
+            </p:nvPr>
+          </p:nvGraphicFramePr>
+          <p:xfrm>
+            <a:off x="8138478" y="3779803"/>
+            <a:ext cx="254000" cy="139700"/>
+          </p:xfrm>
+          <a:graphic>
+            <a:graphicData uri="http://schemas.openxmlformats.org/presentationml/2006/ole">
+              <mc:AlternateContent xmlns:mc="http://schemas.openxmlformats.org/markup-compatibility/2006">
+                <mc:Choice xmlns:v="urn:schemas-microsoft-com:vml" Requires="v">
+                  <p:oleObj spid="_x0000_s1167" name="Equation" r:id="rId18" imgW="253800" imgH="139680" progId="Equation.DSMT4">
+                    <p:embed/>
+                  </p:oleObj>
+                </mc:Choice>
+                <mc:Fallback>
+                  <p:oleObj name="Equation" r:id="rId18" imgW="253800" imgH="139680" progId="Equation.DSMT4">
+                    <p:embed/>
+                    <p:pic>
+                      <p:nvPicPr>
+                        <p:cNvPr id="22" name="对象 21">
+                          <a:extLst>
+                            <a:ext uri="{FF2B5EF4-FFF2-40B4-BE49-F238E27FC236}">
+                              <a16:creationId xmlns:a16="http://schemas.microsoft.com/office/drawing/2014/main" id="{DF1F989E-6FB9-489D-9D51-254F89677AC7}"/>
+                            </a:ext>
+                          </a:extLst>
+                        </p:cNvPr>
+                        <p:cNvPicPr/>
+                        <p:nvPr/>
+                      </p:nvPicPr>
+                      <p:blipFill>
+                        <a:blip r:embed="rId19"/>
+                        <a:stretch>
+                          <a:fillRect/>
+                        </a:stretch>
+                      </p:blipFill>
+                      <p:spPr>
+                        <a:xfrm>
+                          <a:off x="8138478" y="3779803"/>
+                          <a:ext cx="254000" cy="139700"/>
+                        </a:xfrm>
+                        <a:prstGeom prst="rect">
+                          <a:avLst/>
+                        </a:prstGeom>
+                      </p:spPr>
+                    </p:pic>
+                  </p:oleObj>
+                </mc:Fallback>
+              </mc:AlternateContent>
+            </a:graphicData>
+          </a:graphic>
+        </p:graphicFrame>
+      </p:grpSp>
+      <p:grpSp>
+        <p:nvGrpSpPr>
+          <p:cNvPr id="40" name="组合 39">
+            <a:extLst>
+              <a:ext uri="{FF2B5EF4-FFF2-40B4-BE49-F238E27FC236}">
+                <a16:creationId xmlns:a16="http://schemas.microsoft.com/office/drawing/2014/main" id="{518F27B4-5FC5-4A69-A0CC-981E8C041B89}"/>
+              </a:ext>
+            </a:extLst>
+          </p:cNvPr>
+          <p:cNvGrpSpPr/>
+          <p:nvPr/>
+        </p:nvGrpSpPr>
+        <p:grpSpPr>
+          <a:xfrm>
+            <a:off x="3001486" y="563563"/>
+            <a:ext cx="1018223" cy="920281"/>
+            <a:chOff x="3066097" y="563563"/>
+            <a:chExt cx="1018223" cy="920281"/>
+          </a:xfrm>
+        </p:grpSpPr>
+        <p:sp>
+          <p:nvSpPr>
+            <p:cNvPr id="36" name="椭圆 35">
+              <a:extLst>
+                <a:ext uri="{FF2B5EF4-FFF2-40B4-BE49-F238E27FC236}">
+                  <a16:creationId xmlns:a16="http://schemas.microsoft.com/office/drawing/2014/main" id="{0E444870-1B27-4C2B-B122-BB0FDD958B30}"/>
+                </a:ext>
+              </a:extLst>
+            </p:cNvPr>
+            <p:cNvSpPr>
+              <a:spLocks/>
+            </p:cNvSpPr>
+            <p:nvPr/>
+          </p:nvSpPr>
+          <p:spPr>
+            <a:xfrm>
+              <a:off x="3066097" y="579967"/>
+              <a:ext cx="1018223" cy="903877"/>
+            </a:xfrm>
+            <a:prstGeom prst="ellipse">
+              <a:avLst/>
+            </a:prstGeom>
+            <a:noFill/>
+            <a:ln w="25400">
+              <a:solidFill>
+                <a:srgbClr val="377EB8"/>
+              </a:solidFill>
+            </a:ln>
+          </p:spPr>
+          <p:style>
+            <a:lnRef idx="2">
+              <a:schemeClr val="accent1">
+                <a:shade val="50000"/>
+              </a:schemeClr>
+            </a:lnRef>
+            <a:fillRef idx="1">
+              <a:schemeClr val="accent1"/>
+            </a:fillRef>
+            <a:effectRef idx="0">
+              <a:schemeClr val="accent1"/>
+            </a:effectRef>
+            <a:fontRef idx="minor">
+              <a:schemeClr val="lt1"/>
+            </a:fontRef>
+          </p:style>
+          <p:txBody>
+            <a:bodyPr rtlCol="0" anchor="ctr"/>
+            <a:lstStyle/>
+            <a:p>
+              <a:pPr algn="ctr"/>
+              <a:endParaRPr lang="zh-CN" altLang="en-US" dirty="0"/>
+            </a:p>
+          </p:txBody>
+        </p:sp>
+        <p:graphicFrame>
+          <p:nvGraphicFramePr>
+            <p:cNvPr id="37" name="对象 36">
+              <a:extLst>
+                <a:ext uri="{FF2B5EF4-FFF2-40B4-BE49-F238E27FC236}">
+                  <a16:creationId xmlns:a16="http://schemas.microsoft.com/office/drawing/2014/main" id="{EA75769A-C0CE-4C45-B344-180F66AEBAE0}"/>
+                </a:ext>
+              </a:extLst>
+            </p:cNvPr>
+            <p:cNvGraphicFramePr>
+              <a:graphicFrameLocks noChangeAspect="1"/>
+            </p:cNvGraphicFramePr>
+            <p:nvPr>
+              <p:extLst>
+                <p:ext uri="{D42A27DB-BD31-4B8C-83A1-F6EECF244321}">
+                  <p14:modId xmlns:p14="http://schemas.microsoft.com/office/powerpoint/2010/main" val="3600471251"/>
+                </p:ext>
+              </p:extLst>
+            </p:nvPr>
+          </p:nvGraphicFramePr>
+          <p:xfrm>
+            <a:off x="3482975" y="563563"/>
+            <a:ext cx="177800" cy="279400"/>
+          </p:xfrm>
+          <a:graphic>
+            <a:graphicData uri="http://schemas.openxmlformats.org/presentationml/2006/ole">
+              <mc:AlternateContent xmlns:mc="http://schemas.openxmlformats.org/markup-compatibility/2006">
+                <mc:Choice xmlns:v="urn:schemas-microsoft-com:vml" Requires="v">
+                  <p:oleObj spid="_x0000_s1168" name="Equation" r:id="rId20" imgW="177480" imgH="279360" progId="Equation.DSMT4">
+                    <p:embed/>
+                  </p:oleObj>
+                </mc:Choice>
+                <mc:Fallback>
+                  <p:oleObj name="Equation" r:id="rId20" imgW="177480" imgH="279360" progId="Equation.DSMT4">
+                    <p:embed/>
+                    <p:pic>
+                      <p:nvPicPr>
+                        <p:cNvPr id="12" name="对象 11">
+                          <a:extLst>
+                            <a:ext uri="{FF2B5EF4-FFF2-40B4-BE49-F238E27FC236}">
+                              <a16:creationId xmlns:a16="http://schemas.microsoft.com/office/drawing/2014/main" id="{1EB5A1FF-97A4-4ED1-B1DC-F84D688F0238}"/>
+                            </a:ext>
+                          </a:extLst>
+                        </p:cNvPr>
+                        <p:cNvPicPr/>
+                        <p:nvPr/>
+                      </p:nvPicPr>
+                      <p:blipFill>
+                        <a:blip r:embed="rId21"/>
+                        <a:stretch>
+                          <a:fillRect/>
+                        </a:stretch>
+                      </p:blipFill>
+                      <p:spPr>
+                        <a:xfrm>
+                          <a:off x="3482975" y="563563"/>
+                          <a:ext cx="177800" cy="279400"/>
+                        </a:xfrm>
+                        <a:prstGeom prst="rect">
+                          <a:avLst/>
+                        </a:prstGeom>
+                      </p:spPr>
+                    </p:pic>
+                  </p:oleObj>
+                </mc:Fallback>
+              </mc:AlternateContent>
+            </a:graphicData>
+          </a:graphic>
+        </p:graphicFrame>
+        <p:graphicFrame>
+          <p:nvGraphicFramePr>
+            <p:cNvPr id="38" name="对象 37">
+              <a:extLst>
+                <a:ext uri="{FF2B5EF4-FFF2-40B4-BE49-F238E27FC236}">
+                  <a16:creationId xmlns:a16="http://schemas.microsoft.com/office/drawing/2014/main" id="{B6A0ACEA-EBF2-4B58-95FB-F4B63C344C90}"/>
+                </a:ext>
+              </a:extLst>
+            </p:cNvPr>
+            <p:cNvGraphicFramePr>
+              <a:graphicFrameLocks noChangeAspect="1"/>
+            </p:cNvGraphicFramePr>
+            <p:nvPr>
+              <p:extLst>
+                <p:ext uri="{D42A27DB-BD31-4B8C-83A1-F6EECF244321}">
+                  <p14:modId xmlns:p14="http://schemas.microsoft.com/office/powerpoint/2010/main" val="2385560504"/>
+                </p:ext>
+              </p:extLst>
+            </p:nvPr>
+          </p:nvGraphicFramePr>
+          <p:xfrm>
+            <a:off x="3489008" y="907627"/>
+            <a:ext cx="165100" cy="114300"/>
+          </p:xfrm>
+          <a:graphic>
+            <a:graphicData uri="http://schemas.openxmlformats.org/presentationml/2006/ole">
+              <mc:AlternateContent xmlns:mc="http://schemas.openxmlformats.org/markup-compatibility/2006">
+                <mc:Choice xmlns:v="urn:schemas-microsoft-com:vml" Requires="v">
+                  <p:oleObj spid="_x0000_s1169" name="Equation" r:id="rId22" imgW="164880" imgH="114120" progId="Equation.DSMT4">
+                    <p:embed/>
+                  </p:oleObj>
+                </mc:Choice>
+                <mc:Fallback>
+                  <p:oleObj name="Equation" r:id="rId22" imgW="164880" imgH="114120" progId="Equation.DSMT4">
+                    <p:embed/>
+                    <p:pic>
+                      <p:nvPicPr>
+                        <p:cNvPr id="13" name="对象 12">
+                          <a:extLst>
+                            <a:ext uri="{FF2B5EF4-FFF2-40B4-BE49-F238E27FC236}">
+                              <a16:creationId xmlns:a16="http://schemas.microsoft.com/office/drawing/2014/main" id="{11F12D60-D769-4635-834E-BD62CA0C97C4}"/>
+                            </a:ext>
+                          </a:extLst>
+                        </p:cNvPr>
+                        <p:cNvPicPr/>
+                        <p:nvPr/>
+                      </p:nvPicPr>
+                      <p:blipFill>
+                        <a:blip r:embed="rId23"/>
+                        <a:stretch>
+                          <a:fillRect/>
+                        </a:stretch>
+                      </p:blipFill>
+                      <p:spPr>
+                        <a:xfrm>
+                          <a:off x="3489008" y="907627"/>
+                          <a:ext cx="165100" cy="114300"/>
+                        </a:xfrm>
+                        <a:prstGeom prst="rect">
+                          <a:avLst/>
+                        </a:prstGeom>
+                      </p:spPr>
+                    </p:pic>
+                  </p:oleObj>
+                </mc:Fallback>
+              </mc:AlternateContent>
+            </a:graphicData>
+          </a:graphic>
+        </p:graphicFrame>
+        <p:graphicFrame>
+          <p:nvGraphicFramePr>
+            <p:cNvPr id="39" name="对象 38">
+              <a:extLst>
+                <a:ext uri="{FF2B5EF4-FFF2-40B4-BE49-F238E27FC236}">
+                  <a16:creationId xmlns:a16="http://schemas.microsoft.com/office/drawing/2014/main" id="{36F81529-0EBF-4F1B-9853-2F8D1F143ECF}"/>
+                </a:ext>
+              </a:extLst>
+            </p:cNvPr>
+            <p:cNvGraphicFramePr>
+              <a:graphicFrameLocks noChangeAspect="1"/>
+            </p:cNvGraphicFramePr>
+            <p:nvPr>
+              <p:extLst>
+                <p:ext uri="{D42A27DB-BD31-4B8C-83A1-F6EECF244321}">
+                  <p14:modId xmlns:p14="http://schemas.microsoft.com/office/powerpoint/2010/main" val="572494617"/>
+                </p:ext>
+              </p:extLst>
+            </p:nvPr>
+          </p:nvGraphicFramePr>
+          <p:xfrm>
+            <a:off x="3152775" y="1085850"/>
+            <a:ext cx="838200" cy="254000"/>
+          </p:xfrm>
+          <a:graphic>
+            <a:graphicData uri="http://schemas.openxmlformats.org/presentationml/2006/ole">
+              <mc:AlternateContent xmlns:mc="http://schemas.openxmlformats.org/markup-compatibility/2006">
+                <mc:Choice xmlns:v="urn:schemas-microsoft-com:vml" Requires="v">
+                  <p:oleObj spid="_x0000_s1170" name="Equation" r:id="rId24" imgW="838080" imgH="253800" progId="Equation.DSMT4">
+                    <p:embed/>
+                  </p:oleObj>
+                </mc:Choice>
+                <mc:Fallback>
+                  <p:oleObj name="Equation" r:id="rId24" imgW="838080" imgH="253800" progId="Equation.DSMT4">
+                    <p:embed/>
+                    <p:pic>
+                      <p:nvPicPr>
+                        <p:cNvPr id="17" name="对象 16">
+                          <a:extLst>
+                            <a:ext uri="{FF2B5EF4-FFF2-40B4-BE49-F238E27FC236}">
+                              <a16:creationId xmlns:a16="http://schemas.microsoft.com/office/drawing/2014/main" id="{2D95B63C-64A1-42DF-8F07-4261872DEF0B}"/>
+                            </a:ext>
+                          </a:extLst>
+                        </p:cNvPr>
+                        <p:cNvPicPr/>
+                        <p:nvPr/>
+                      </p:nvPicPr>
+                      <p:blipFill>
+                        <a:blip r:embed="rId25"/>
+                        <a:stretch>
+                          <a:fillRect/>
+                        </a:stretch>
+                      </p:blipFill>
+                      <p:spPr>
+                        <a:xfrm>
+                          <a:off x="3152775" y="1085850"/>
+                          <a:ext cx="838200" cy="254000"/>
+                        </a:xfrm>
+                        <a:prstGeom prst="rect">
+                          <a:avLst/>
+                        </a:prstGeom>
+                      </p:spPr>
+                    </p:pic>
+                  </p:oleObj>
+                </mc:Fallback>
+              </mc:AlternateContent>
+            </a:graphicData>
+          </a:graphic>
+        </p:graphicFrame>
+      </p:grpSp>
+      <p:grpSp>
+        <p:nvGrpSpPr>
+          <p:cNvPr id="100" name="组合 99">
+            <a:extLst>
+              <a:ext uri="{FF2B5EF4-FFF2-40B4-BE49-F238E27FC236}">
+                <a16:creationId xmlns:a16="http://schemas.microsoft.com/office/drawing/2014/main" id="{B2DB6D16-0904-4E86-AEFD-9F70822BC479}"/>
+              </a:ext>
+            </a:extLst>
+          </p:cNvPr>
+          <p:cNvGrpSpPr/>
+          <p:nvPr/>
+        </p:nvGrpSpPr>
+        <p:grpSpPr>
+          <a:xfrm>
+            <a:off x="3001486" y="1980546"/>
+            <a:ext cx="1018223" cy="3737077"/>
+            <a:chOff x="3001486" y="1980546"/>
+            <a:chExt cx="1018223" cy="3737077"/>
+          </a:xfrm>
+        </p:grpSpPr>
+        <p:grpSp>
+          <p:nvGrpSpPr>
+            <p:cNvPr id="41" name="组合 40">
+              <a:extLst>
+                <a:ext uri="{FF2B5EF4-FFF2-40B4-BE49-F238E27FC236}">
+                  <a16:creationId xmlns:a16="http://schemas.microsoft.com/office/drawing/2014/main" id="{75839778-136C-421F-AB7A-4B5F1266BF49}"/>
+                </a:ext>
+              </a:extLst>
+            </p:cNvPr>
+            <p:cNvGrpSpPr/>
+            <p:nvPr/>
+          </p:nvGrpSpPr>
+          <p:grpSpPr>
+            <a:xfrm>
+              <a:off x="3001486" y="1980546"/>
+              <a:ext cx="1018223" cy="919598"/>
+              <a:chOff x="3066097" y="564246"/>
+              <a:chExt cx="1018223" cy="919598"/>
+            </a:xfrm>
+          </p:grpSpPr>
+          <p:sp>
+            <p:nvSpPr>
+              <p:cNvPr id="42" name="椭圆 41">
+                <a:extLst>
+                  <a:ext uri="{FF2B5EF4-FFF2-40B4-BE49-F238E27FC236}">
+                    <a16:creationId xmlns:a16="http://schemas.microsoft.com/office/drawing/2014/main" id="{F0EC0E03-D468-4FBD-9450-47EA3A3E676F}"/>
+                  </a:ext>
+                </a:extLst>
+              </p:cNvPr>
+              <p:cNvSpPr>
+                <a:spLocks/>
+              </p:cNvSpPr>
+              <p:nvPr/>
+            </p:nvSpPr>
+            <p:spPr>
+              <a:xfrm>
+                <a:off x="3066097" y="579967"/>
+                <a:ext cx="1018223" cy="903877"/>
+              </a:xfrm>
+              <a:prstGeom prst="ellipse">
+                <a:avLst/>
+              </a:prstGeom>
+              <a:noFill/>
+              <a:ln w="25400">
+                <a:solidFill>
+                  <a:srgbClr val="377EB8"/>
+                </a:solidFill>
+              </a:ln>
+            </p:spPr>
+            <p:style>
+              <a:lnRef idx="2">
+                <a:schemeClr val="accent1">
+                  <a:shade val="50000"/>
+                </a:schemeClr>
+              </a:lnRef>
+              <a:fillRef idx="1">
+                <a:schemeClr val="accent1"/>
+              </a:fillRef>
+              <a:effectRef idx="0">
+                <a:schemeClr val="accent1"/>
+              </a:effectRef>
+              <a:fontRef idx="minor">
+                <a:schemeClr val="lt1"/>
+              </a:fontRef>
+            </p:style>
+            <p:txBody>
+              <a:bodyPr rtlCol="0" anchor="ctr"/>
+              <a:lstStyle/>
+              <a:p>
+                <a:pPr algn="ctr"/>
+                <a:endParaRPr lang="zh-CN" altLang="en-US" dirty="0"/>
+              </a:p>
+            </p:txBody>
+          </p:sp>
+          <p:graphicFrame>
+            <p:nvGraphicFramePr>
+              <p:cNvPr id="43" name="对象 42">
+                <a:extLst>
+                  <a:ext uri="{FF2B5EF4-FFF2-40B4-BE49-F238E27FC236}">
+                    <a16:creationId xmlns:a16="http://schemas.microsoft.com/office/drawing/2014/main" id="{6BC6AE1D-44A0-445D-B1F6-8F62F3FD4B71}"/>
+                  </a:ext>
+                </a:extLst>
+              </p:cNvPr>
+              <p:cNvGraphicFramePr>
+                <a:graphicFrameLocks noChangeAspect="1"/>
+              </p:cNvGraphicFramePr>
+              <p:nvPr>
+                <p:extLst>
+                  <p:ext uri="{D42A27DB-BD31-4B8C-83A1-F6EECF244321}">
+                    <p14:modId xmlns:p14="http://schemas.microsoft.com/office/powerpoint/2010/main" val="1578483864"/>
+                  </p:ext>
+                </p:extLst>
+              </p:nvPr>
+            </p:nvGraphicFramePr>
+            <p:xfrm>
+              <a:off x="3469799" y="564246"/>
+              <a:ext cx="203200" cy="279400"/>
+            </p:xfrm>
+            <a:graphic>
+              <a:graphicData uri="http://schemas.openxmlformats.org/presentationml/2006/ole">
+                <mc:AlternateContent xmlns:mc="http://schemas.openxmlformats.org/markup-compatibility/2006">
+                  <mc:Choice xmlns:v="urn:schemas-microsoft-com:vml" Requires="v">
+                    <p:oleObj spid="_x0000_s1171" name="Equation" r:id="rId26" imgW="203040" imgH="279360" progId="Equation.DSMT4">
+                      <p:embed/>
+                    </p:oleObj>
+                  </mc:Choice>
+                  <mc:Fallback>
+                    <p:oleObj name="Equation" r:id="rId26" imgW="203040" imgH="279360" progId="Equation.DSMT4">
+                      <p:embed/>
+                      <p:pic>
+                        <p:nvPicPr>
+                          <p:cNvPr id="37" name="对象 36">
+                            <a:extLst>
+                              <a:ext uri="{FF2B5EF4-FFF2-40B4-BE49-F238E27FC236}">
+                                <a16:creationId xmlns:a16="http://schemas.microsoft.com/office/drawing/2014/main" id="{EA75769A-C0CE-4C45-B344-180F66AEBAE0}"/>
+                              </a:ext>
+                            </a:extLst>
+                          </p:cNvPr>
+                          <p:cNvPicPr/>
+                          <p:nvPr/>
+                        </p:nvPicPr>
+                        <p:blipFill>
+                          <a:blip r:embed="rId27"/>
+                          <a:stretch>
+                            <a:fillRect/>
+                          </a:stretch>
+                        </p:blipFill>
+                        <p:spPr>
+                          <a:xfrm>
+                            <a:off x="3469799" y="564246"/>
+                            <a:ext cx="203200" cy="279400"/>
+                          </a:xfrm>
+                          <a:prstGeom prst="rect">
+                            <a:avLst/>
+                          </a:prstGeom>
+                        </p:spPr>
+                      </p:pic>
+                    </p:oleObj>
+                  </mc:Fallback>
+                </mc:AlternateContent>
+              </a:graphicData>
+            </a:graphic>
+          </p:graphicFrame>
+          <p:graphicFrame>
+            <p:nvGraphicFramePr>
+              <p:cNvPr id="44" name="对象 43">
+                <a:extLst>
+                  <a:ext uri="{FF2B5EF4-FFF2-40B4-BE49-F238E27FC236}">
+                    <a16:creationId xmlns:a16="http://schemas.microsoft.com/office/drawing/2014/main" id="{E84AA97D-0AF7-4017-8545-E2D08229FDC2}"/>
+                  </a:ext>
+                </a:extLst>
+              </p:cNvPr>
+              <p:cNvGraphicFramePr>
+                <a:graphicFrameLocks noChangeAspect="1"/>
+              </p:cNvGraphicFramePr>
+              <p:nvPr>
+                <p:extLst>
+                  <p:ext uri="{D42A27DB-BD31-4B8C-83A1-F6EECF244321}">
+                    <p14:modId xmlns:p14="http://schemas.microsoft.com/office/powerpoint/2010/main" val="2385560504"/>
+                  </p:ext>
+                </p:extLst>
+              </p:nvPr>
+            </p:nvGraphicFramePr>
+            <p:xfrm>
+              <a:off x="3489008" y="907627"/>
+              <a:ext cx="165100" cy="114300"/>
+            </p:xfrm>
+            <a:graphic>
+              <a:graphicData uri="http://schemas.openxmlformats.org/presentationml/2006/ole">
+                <mc:AlternateContent xmlns:mc="http://schemas.openxmlformats.org/markup-compatibility/2006">
+                  <mc:Choice xmlns:v="urn:schemas-microsoft-com:vml" Requires="v">
+                    <p:oleObj spid="_x0000_s1172" name="Equation" r:id="rId28" imgW="164880" imgH="114120" progId="Equation.DSMT4">
+                      <p:embed/>
+                    </p:oleObj>
+                  </mc:Choice>
+                  <mc:Fallback>
+                    <p:oleObj name="Equation" r:id="rId28" imgW="164880" imgH="114120" progId="Equation.DSMT4">
+                      <p:embed/>
+                      <p:pic>
+                        <p:nvPicPr>
+                          <p:cNvPr id="38" name="对象 37">
+                            <a:extLst>
+                              <a:ext uri="{FF2B5EF4-FFF2-40B4-BE49-F238E27FC236}">
+                                <a16:creationId xmlns:a16="http://schemas.microsoft.com/office/drawing/2014/main" id="{B6A0ACEA-EBF2-4B58-95FB-F4B63C344C90}"/>
+                              </a:ext>
+                            </a:extLst>
+                          </p:cNvPr>
+                          <p:cNvPicPr/>
+                          <p:nvPr/>
+                        </p:nvPicPr>
+                        <p:blipFill>
+                          <a:blip r:embed="rId23"/>
+                          <a:stretch>
+                            <a:fillRect/>
+                          </a:stretch>
+                        </p:blipFill>
+                        <p:spPr>
+                          <a:xfrm>
+                            <a:off x="3489008" y="907627"/>
+                            <a:ext cx="165100" cy="114300"/>
+                          </a:xfrm>
+                          <a:prstGeom prst="rect">
+                            <a:avLst/>
+                          </a:prstGeom>
+                        </p:spPr>
+                      </p:pic>
+                    </p:oleObj>
+                  </mc:Fallback>
+                </mc:AlternateContent>
+              </a:graphicData>
+            </a:graphic>
+          </p:graphicFrame>
+          <p:graphicFrame>
+            <p:nvGraphicFramePr>
+              <p:cNvPr id="45" name="对象 44">
+                <a:extLst>
+                  <a:ext uri="{FF2B5EF4-FFF2-40B4-BE49-F238E27FC236}">
+                    <a16:creationId xmlns:a16="http://schemas.microsoft.com/office/drawing/2014/main" id="{985F4C0E-F1F3-40B1-BBC3-43DDB1B25563}"/>
+                  </a:ext>
+                </a:extLst>
+              </p:cNvPr>
+              <p:cNvGraphicFramePr>
+                <a:graphicFrameLocks noChangeAspect="1"/>
+              </p:cNvGraphicFramePr>
+              <p:nvPr>
+                <p:extLst>
+                  <p:ext uri="{D42A27DB-BD31-4B8C-83A1-F6EECF244321}">
+                    <p14:modId xmlns:p14="http://schemas.microsoft.com/office/powerpoint/2010/main" val="1717122809"/>
+                  </p:ext>
+                </p:extLst>
+              </p:nvPr>
+            </p:nvGraphicFramePr>
+            <p:xfrm>
+              <a:off x="3152775" y="1085850"/>
+              <a:ext cx="838200" cy="254000"/>
+            </p:xfrm>
+            <a:graphic>
+              <a:graphicData uri="http://schemas.openxmlformats.org/presentationml/2006/ole">
+                <mc:AlternateContent xmlns:mc="http://schemas.openxmlformats.org/markup-compatibility/2006">
+                  <mc:Choice xmlns:v="urn:schemas-microsoft-com:vml" Requires="v">
+                    <p:oleObj spid="_x0000_s1173" name="Equation" r:id="rId29" imgW="838080" imgH="253800" progId="Equation.DSMT4">
+                      <p:embed/>
+                    </p:oleObj>
+                  </mc:Choice>
+                  <mc:Fallback>
+                    <p:oleObj name="Equation" r:id="rId29" imgW="838080" imgH="253800" progId="Equation.DSMT4">
+                      <p:embed/>
+                      <p:pic>
+                        <p:nvPicPr>
+                          <p:cNvPr id="39" name="对象 38">
+                            <a:extLst>
+                              <a:ext uri="{FF2B5EF4-FFF2-40B4-BE49-F238E27FC236}">
+                                <a16:creationId xmlns:a16="http://schemas.microsoft.com/office/drawing/2014/main" id="{36F81529-0EBF-4F1B-9853-2F8D1F143ECF}"/>
+                              </a:ext>
+                            </a:extLst>
+                          </p:cNvPr>
+                          <p:cNvPicPr/>
+                          <p:nvPr/>
+                        </p:nvPicPr>
+                        <p:blipFill>
+                          <a:blip r:embed="rId30"/>
+                          <a:stretch>
+                            <a:fillRect/>
+                          </a:stretch>
+                        </p:blipFill>
+                        <p:spPr>
+                          <a:xfrm>
+                            <a:off x="3152775" y="1085850"/>
+                            <a:ext cx="838200" cy="254000"/>
+                          </a:xfrm>
+                          <a:prstGeom prst="rect">
+                            <a:avLst/>
+                          </a:prstGeom>
+                        </p:spPr>
+                      </p:pic>
+                    </p:oleObj>
+                  </mc:Fallback>
+                </mc:AlternateContent>
+              </a:graphicData>
+            </a:graphic>
+          </p:graphicFrame>
+        </p:grpSp>
+        <p:grpSp>
+          <p:nvGrpSpPr>
+            <p:cNvPr id="51" name="组合 50">
+              <a:extLst>
+                <a:ext uri="{FF2B5EF4-FFF2-40B4-BE49-F238E27FC236}">
+                  <a16:creationId xmlns:a16="http://schemas.microsoft.com/office/drawing/2014/main" id="{CCAD5554-3E16-4198-8C77-7DD0C28DBEC8}"/>
+                </a:ext>
+              </a:extLst>
+            </p:cNvPr>
+            <p:cNvGrpSpPr/>
+            <p:nvPr/>
+          </p:nvGrpSpPr>
+          <p:grpSpPr>
+            <a:xfrm>
+              <a:off x="3001486" y="4797425"/>
+              <a:ext cx="1018223" cy="920198"/>
+              <a:chOff x="3066097" y="563646"/>
+              <a:chExt cx="1018223" cy="920198"/>
+            </a:xfrm>
+          </p:grpSpPr>
+          <p:sp>
+            <p:nvSpPr>
+              <p:cNvPr id="52" name="椭圆 51">
+                <a:extLst>
+                  <a:ext uri="{FF2B5EF4-FFF2-40B4-BE49-F238E27FC236}">
+                    <a16:creationId xmlns:a16="http://schemas.microsoft.com/office/drawing/2014/main" id="{512306EF-2EDB-464A-A8F8-2160AC13CD93}"/>
+                  </a:ext>
+                </a:extLst>
+              </p:cNvPr>
+              <p:cNvSpPr>
+                <a:spLocks/>
+              </p:cNvSpPr>
+              <p:nvPr/>
+            </p:nvSpPr>
+            <p:spPr>
+              <a:xfrm>
+                <a:off x="3066097" y="579967"/>
+                <a:ext cx="1018223" cy="903877"/>
+              </a:xfrm>
+              <a:prstGeom prst="ellipse">
+                <a:avLst/>
+              </a:prstGeom>
+              <a:noFill/>
+              <a:ln w="25400">
+                <a:solidFill>
+                  <a:srgbClr val="377EB8"/>
+                </a:solidFill>
+              </a:ln>
+            </p:spPr>
+            <p:style>
+              <a:lnRef idx="2">
+                <a:schemeClr val="accent1">
+                  <a:shade val="50000"/>
+                </a:schemeClr>
+              </a:lnRef>
+              <a:fillRef idx="1">
+                <a:schemeClr val="accent1"/>
+              </a:fillRef>
+              <a:effectRef idx="0">
+                <a:schemeClr val="accent1"/>
+              </a:effectRef>
+              <a:fontRef idx="minor">
+                <a:schemeClr val="lt1"/>
+              </a:fontRef>
+            </p:style>
+            <p:txBody>
+              <a:bodyPr rtlCol="0" anchor="ctr"/>
+              <a:lstStyle/>
+              <a:p>
+                <a:pPr algn="ctr"/>
+                <a:endParaRPr lang="zh-CN" altLang="en-US" dirty="0"/>
+              </a:p>
+            </p:txBody>
+          </p:sp>
+          <p:graphicFrame>
+            <p:nvGraphicFramePr>
+              <p:cNvPr id="53" name="对象 52">
+                <a:extLst>
+                  <a:ext uri="{FF2B5EF4-FFF2-40B4-BE49-F238E27FC236}">
+                    <a16:creationId xmlns:a16="http://schemas.microsoft.com/office/drawing/2014/main" id="{E72549A0-FDDE-45B9-8128-86C2743E677C}"/>
+                  </a:ext>
+                </a:extLst>
+              </p:cNvPr>
+              <p:cNvGraphicFramePr>
+                <a:graphicFrameLocks noChangeAspect="1"/>
+              </p:cNvGraphicFramePr>
+              <p:nvPr>
+                <p:extLst>
+                  <p:ext uri="{D42A27DB-BD31-4B8C-83A1-F6EECF244321}">
+                    <p14:modId xmlns:p14="http://schemas.microsoft.com/office/powerpoint/2010/main" val="2753985092"/>
+                  </p:ext>
+                </p:extLst>
+              </p:nvPr>
+            </p:nvGraphicFramePr>
+            <p:xfrm>
+              <a:off x="3470910" y="563646"/>
+              <a:ext cx="203200" cy="279400"/>
+            </p:xfrm>
+            <a:graphic>
+              <a:graphicData uri="http://schemas.openxmlformats.org/presentationml/2006/ole">
+                <mc:AlternateContent xmlns:mc="http://schemas.openxmlformats.org/markup-compatibility/2006">
+                  <mc:Choice xmlns:v="urn:schemas-microsoft-com:vml" Requires="v">
+                    <p:oleObj spid="_x0000_s1174" name="Equation" r:id="rId31" imgW="203040" imgH="279360" progId="Equation.DSMT4">
+                      <p:embed/>
+                    </p:oleObj>
+                  </mc:Choice>
+                  <mc:Fallback>
+                    <p:oleObj name="Equation" r:id="rId31" imgW="203040" imgH="279360" progId="Equation.DSMT4">
+                      <p:embed/>
+                      <p:pic>
+                        <p:nvPicPr>
+                          <p:cNvPr id="48" name="对象 47">
+                            <a:extLst>
+                              <a:ext uri="{FF2B5EF4-FFF2-40B4-BE49-F238E27FC236}">
+                                <a16:creationId xmlns:a16="http://schemas.microsoft.com/office/drawing/2014/main" id="{24282D9F-1EE9-457D-B7A1-5F849A4C8C74}"/>
+                              </a:ext>
+                            </a:extLst>
+                          </p:cNvPr>
+                          <p:cNvPicPr/>
+                          <p:nvPr/>
+                        </p:nvPicPr>
+                        <p:blipFill>
+                          <a:blip r:embed="rId32"/>
+                          <a:stretch>
+                            <a:fillRect/>
+                          </a:stretch>
+                        </p:blipFill>
+                        <p:spPr>
+                          <a:xfrm>
+                            <a:off x="3470910" y="563646"/>
+                            <a:ext cx="203200" cy="279400"/>
+                          </a:xfrm>
+                          <a:prstGeom prst="rect">
+                            <a:avLst/>
+                          </a:prstGeom>
+                        </p:spPr>
+                      </p:pic>
+                    </p:oleObj>
+                  </mc:Fallback>
+                </mc:AlternateContent>
+              </a:graphicData>
+            </a:graphic>
+          </p:graphicFrame>
+          <p:graphicFrame>
+            <p:nvGraphicFramePr>
+              <p:cNvPr id="54" name="对象 53">
+                <a:extLst>
+                  <a:ext uri="{FF2B5EF4-FFF2-40B4-BE49-F238E27FC236}">
+                    <a16:creationId xmlns:a16="http://schemas.microsoft.com/office/drawing/2014/main" id="{3289201A-5410-444C-BA14-698A35B299D7}"/>
+                  </a:ext>
+                </a:extLst>
+              </p:cNvPr>
+              <p:cNvGraphicFramePr>
+                <a:graphicFrameLocks noChangeAspect="1"/>
+              </p:cNvGraphicFramePr>
+              <p:nvPr>
+                <p:extLst>
+                  <p:ext uri="{D42A27DB-BD31-4B8C-83A1-F6EECF244321}">
+                    <p14:modId xmlns:p14="http://schemas.microsoft.com/office/powerpoint/2010/main" val="2385560504"/>
+                  </p:ext>
+                </p:extLst>
+              </p:nvPr>
+            </p:nvGraphicFramePr>
+            <p:xfrm>
+              <a:off x="3489008" y="907627"/>
+              <a:ext cx="165100" cy="114300"/>
+            </p:xfrm>
+            <a:graphic>
+              <a:graphicData uri="http://schemas.openxmlformats.org/presentationml/2006/ole">
+                <mc:AlternateContent xmlns:mc="http://schemas.openxmlformats.org/markup-compatibility/2006">
+                  <mc:Choice xmlns:v="urn:schemas-microsoft-com:vml" Requires="v">
+                    <p:oleObj spid="_x0000_s1175" name="Equation" r:id="rId33" imgW="164880" imgH="114120" progId="Equation.DSMT4">
+                      <p:embed/>
+                    </p:oleObj>
+                  </mc:Choice>
+                  <mc:Fallback>
+                    <p:oleObj name="Equation" r:id="rId33" imgW="164880" imgH="114120" progId="Equation.DSMT4">
+                      <p:embed/>
+                      <p:pic>
+                        <p:nvPicPr>
+                          <p:cNvPr id="49" name="对象 48">
+                            <a:extLst>
+                              <a:ext uri="{FF2B5EF4-FFF2-40B4-BE49-F238E27FC236}">
+                                <a16:creationId xmlns:a16="http://schemas.microsoft.com/office/drawing/2014/main" id="{35FFBF67-E00F-45BF-B7B6-F3720B4D1FCC}"/>
+                              </a:ext>
+                            </a:extLst>
+                          </p:cNvPr>
+                          <p:cNvPicPr/>
+                          <p:nvPr/>
+                        </p:nvPicPr>
+                        <p:blipFill>
+                          <a:blip r:embed="rId23"/>
+                          <a:stretch>
+                            <a:fillRect/>
+                          </a:stretch>
+                        </p:blipFill>
+                        <p:spPr>
+                          <a:xfrm>
+                            <a:off x="3489008" y="907627"/>
+                            <a:ext cx="165100" cy="114300"/>
+                          </a:xfrm>
+                          <a:prstGeom prst="rect">
+                            <a:avLst/>
+                          </a:prstGeom>
+                        </p:spPr>
+                      </p:pic>
+                    </p:oleObj>
+                  </mc:Fallback>
+                </mc:AlternateContent>
+              </a:graphicData>
+            </a:graphic>
+          </p:graphicFrame>
+          <p:graphicFrame>
+            <p:nvGraphicFramePr>
+              <p:cNvPr id="55" name="对象 54">
+                <a:extLst>
+                  <a:ext uri="{FF2B5EF4-FFF2-40B4-BE49-F238E27FC236}">
+                    <a16:creationId xmlns:a16="http://schemas.microsoft.com/office/drawing/2014/main" id="{C1E9D38F-73A1-4F58-BC11-D0714CEA4445}"/>
+                  </a:ext>
+                </a:extLst>
+              </p:cNvPr>
+              <p:cNvGraphicFramePr>
+                <a:graphicFrameLocks noChangeAspect="1"/>
+              </p:cNvGraphicFramePr>
+              <p:nvPr>
+                <p:extLst>
+                  <p:ext uri="{D42A27DB-BD31-4B8C-83A1-F6EECF244321}">
+                    <p14:modId xmlns:p14="http://schemas.microsoft.com/office/powerpoint/2010/main" val="1717122809"/>
+                  </p:ext>
+                </p:extLst>
+              </p:nvPr>
+            </p:nvGraphicFramePr>
+            <p:xfrm>
+              <a:off x="3152775" y="1085850"/>
+              <a:ext cx="838200" cy="254000"/>
+            </p:xfrm>
+            <a:graphic>
+              <a:graphicData uri="http://schemas.openxmlformats.org/presentationml/2006/ole">
+                <mc:AlternateContent xmlns:mc="http://schemas.openxmlformats.org/markup-compatibility/2006">
+                  <mc:Choice xmlns:v="urn:schemas-microsoft-com:vml" Requires="v">
+                    <p:oleObj spid="_x0000_s1176" name="Equation" r:id="rId34" imgW="838080" imgH="253800" progId="Equation.DSMT4">
+                      <p:embed/>
+                    </p:oleObj>
+                  </mc:Choice>
+                  <mc:Fallback>
+                    <p:oleObj name="Equation" r:id="rId34" imgW="838080" imgH="253800" progId="Equation.DSMT4">
+                      <p:embed/>
+                      <p:pic>
+                        <p:nvPicPr>
+                          <p:cNvPr id="50" name="对象 49">
+                            <a:extLst>
+                              <a:ext uri="{FF2B5EF4-FFF2-40B4-BE49-F238E27FC236}">
+                                <a16:creationId xmlns:a16="http://schemas.microsoft.com/office/drawing/2014/main" id="{FEE68268-79CE-436B-B17C-DCB48F7D267B}"/>
+                              </a:ext>
+                            </a:extLst>
+                          </p:cNvPr>
+                          <p:cNvPicPr/>
+                          <p:nvPr/>
+                        </p:nvPicPr>
+                        <p:blipFill>
+                          <a:blip r:embed="rId30"/>
+                          <a:stretch>
+                            <a:fillRect/>
+                          </a:stretch>
+                        </p:blipFill>
+                        <p:spPr>
+                          <a:xfrm>
+                            <a:off x="3152775" y="1085850"/>
+                            <a:ext cx="838200" cy="254000"/>
+                          </a:xfrm>
+                          <a:prstGeom prst="rect">
+                            <a:avLst/>
+                          </a:prstGeom>
+                        </p:spPr>
+                      </p:pic>
+                    </p:oleObj>
+                  </mc:Fallback>
+                </mc:AlternateContent>
+              </a:graphicData>
+            </a:graphic>
+          </p:graphicFrame>
+        </p:grpSp>
+        <p:grpSp>
+          <p:nvGrpSpPr>
+            <p:cNvPr id="57" name="组合 56">
+              <a:extLst>
+                <a:ext uri="{FF2B5EF4-FFF2-40B4-BE49-F238E27FC236}">
+                  <a16:creationId xmlns:a16="http://schemas.microsoft.com/office/drawing/2014/main" id="{A9220EC8-EE09-4290-92D3-DBB3BE0AFAB3}"/>
+                </a:ext>
+              </a:extLst>
+            </p:cNvPr>
+            <p:cNvGrpSpPr/>
+            <p:nvPr/>
+          </p:nvGrpSpPr>
+          <p:grpSpPr>
+            <a:xfrm>
+              <a:off x="3001486" y="3396846"/>
+              <a:ext cx="1018223" cy="903877"/>
+              <a:chOff x="4135437" y="3385345"/>
+              <a:chExt cx="1018223" cy="903877"/>
+            </a:xfrm>
+          </p:grpSpPr>
+          <p:sp>
+            <p:nvSpPr>
+              <p:cNvPr id="47" name="椭圆 46">
+                <a:extLst>
+                  <a:ext uri="{FF2B5EF4-FFF2-40B4-BE49-F238E27FC236}">
+                    <a16:creationId xmlns:a16="http://schemas.microsoft.com/office/drawing/2014/main" id="{2BD897CD-87AF-448D-9FBD-4647C6277993}"/>
+                  </a:ext>
+                </a:extLst>
+              </p:cNvPr>
+              <p:cNvSpPr>
+                <a:spLocks/>
+              </p:cNvSpPr>
+              <p:nvPr/>
+            </p:nvSpPr>
+            <p:spPr>
+              <a:xfrm>
+                <a:off x="4135437" y="3385345"/>
+                <a:ext cx="1018223" cy="903877"/>
+              </a:xfrm>
+              <a:prstGeom prst="ellipse">
+                <a:avLst/>
+              </a:prstGeom>
+              <a:noFill/>
+              <a:ln w="25400">
+                <a:solidFill>
+                  <a:srgbClr val="377EB8"/>
+                </a:solidFill>
+              </a:ln>
+            </p:spPr>
+            <p:style>
+              <a:lnRef idx="2">
+                <a:schemeClr val="accent1">
+                  <a:shade val="50000"/>
+                </a:schemeClr>
+              </a:lnRef>
+              <a:fillRef idx="1">
+                <a:schemeClr val="accent1"/>
+              </a:fillRef>
+              <a:effectRef idx="0">
+                <a:schemeClr val="accent1"/>
+              </a:effectRef>
+              <a:fontRef idx="minor">
+                <a:schemeClr val="lt1"/>
+              </a:fontRef>
+            </p:style>
+            <p:txBody>
+              <a:bodyPr rtlCol="0" anchor="ctr"/>
+              <a:lstStyle/>
+              <a:p>
+                <a:pPr algn="ctr"/>
+                <a:endParaRPr lang="zh-CN" altLang="en-US" dirty="0"/>
+              </a:p>
+            </p:txBody>
+          </p:sp>
+          <p:graphicFrame>
+            <p:nvGraphicFramePr>
+              <p:cNvPr id="56" name="对象 55">
+                <a:extLst>
+                  <a:ext uri="{FF2B5EF4-FFF2-40B4-BE49-F238E27FC236}">
+                    <a16:creationId xmlns:a16="http://schemas.microsoft.com/office/drawing/2014/main" id="{91048F03-ED60-4FB2-A38F-B2C9B46AA183}"/>
+                  </a:ext>
+                </a:extLst>
+              </p:cNvPr>
+              <p:cNvGraphicFramePr>
+                <a:graphicFrameLocks noChangeAspect="1"/>
+              </p:cNvGraphicFramePr>
+              <p:nvPr>
+                <p:extLst>
+                  <p:ext uri="{D42A27DB-BD31-4B8C-83A1-F6EECF244321}">
+                    <p14:modId xmlns:p14="http://schemas.microsoft.com/office/powerpoint/2010/main" val="2924489776"/>
+                  </p:ext>
+                </p:extLst>
+              </p:nvPr>
+            </p:nvGraphicFramePr>
+            <p:xfrm>
+              <a:off x="4517548" y="3767433"/>
+              <a:ext cx="254000" cy="139700"/>
+            </p:xfrm>
+            <a:graphic>
+              <a:graphicData uri="http://schemas.openxmlformats.org/presentationml/2006/ole">
+                <mc:AlternateContent xmlns:mc="http://schemas.openxmlformats.org/markup-compatibility/2006">
+                  <mc:Choice xmlns:v="urn:schemas-microsoft-com:vml" Requires="v">
+                    <p:oleObj spid="_x0000_s1177" name="Equation" r:id="rId35" imgW="254539" imgH="140405" progId="Equation.DSMT4">
+                      <p:embed/>
+                    </p:oleObj>
+                  </mc:Choice>
+                  <mc:Fallback>
+                    <p:oleObj name="Equation" r:id="rId35" imgW="254539" imgH="140405" progId="Equation.DSMT4">
+                      <p:embed/>
+                      <p:pic>
+                        <p:nvPicPr>
+                          <p:cNvPr id="0" name=""/>
+                          <p:cNvPicPr/>
+                          <p:nvPr/>
+                        </p:nvPicPr>
+                        <p:blipFill>
+                          <a:blip r:embed="rId36"/>
+                          <a:stretch>
+                            <a:fillRect/>
+                          </a:stretch>
+                        </p:blipFill>
+                        <p:spPr>
+                          <a:xfrm>
+                            <a:off x="4517548" y="3767433"/>
+                            <a:ext cx="254000" cy="139700"/>
+                          </a:xfrm>
+                          <a:prstGeom prst="rect">
+                            <a:avLst/>
+                          </a:prstGeom>
+                        </p:spPr>
+                      </p:pic>
+                    </p:oleObj>
+                  </mc:Fallback>
+                </mc:AlternateContent>
+              </a:graphicData>
+            </a:graphic>
+          </p:graphicFrame>
+        </p:grpSp>
+      </p:grpSp>
+      <p:grpSp>
+        <p:nvGrpSpPr>
+          <p:cNvPr id="98" name="组合 97">
+            <a:extLst>
+              <a:ext uri="{FF2B5EF4-FFF2-40B4-BE49-F238E27FC236}">
+                <a16:creationId xmlns:a16="http://schemas.microsoft.com/office/drawing/2014/main" id="{3E25C8C5-B491-4187-8B66-F7F59B086407}"/>
+              </a:ext>
+            </a:extLst>
+          </p:cNvPr>
+          <p:cNvGrpSpPr/>
+          <p:nvPr/>
+        </p:nvGrpSpPr>
+        <p:grpSpPr>
+          <a:xfrm>
+            <a:off x="5381229" y="1166278"/>
+            <a:ext cx="949960" cy="843280"/>
+            <a:chOff x="5381229" y="1166278"/>
+            <a:chExt cx="949960" cy="843280"/>
+          </a:xfrm>
+        </p:grpSpPr>
+        <p:sp>
+          <p:nvSpPr>
+            <p:cNvPr id="59" name="椭圆 58">
+              <a:extLst>
+                <a:ext uri="{FF2B5EF4-FFF2-40B4-BE49-F238E27FC236}">
+                  <a16:creationId xmlns:a16="http://schemas.microsoft.com/office/drawing/2014/main" id="{A975FCA0-7CF2-4BB6-9C4F-4B3791E5D424}"/>
+                </a:ext>
+              </a:extLst>
+            </p:cNvPr>
+            <p:cNvSpPr>
+              <a:spLocks/>
+            </p:cNvSpPr>
+            <p:nvPr/>
+          </p:nvSpPr>
+          <p:spPr>
+            <a:xfrm>
+              <a:off x="5381229" y="1166278"/>
+              <a:ext cx="949960" cy="843280"/>
+            </a:xfrm>
+            <a:prstGeom prst="ellipse">
+              <a:avLst/>
+            </a:prstGeom>
+            <a:noFill/>
+            <a:ln w="25400">
+              <a:solidFill>
+                <a:srgbClr val="E41A1C"/>
+              </a:solidFill>
+            </a:ln>
+          </p:spPr>
+          <p:style>
+            <a:lnRef idx="2">
+              <a:schemeClr val="accent1">
+                <a:shade val="50000"/>
+              </a:schemeClr>
+            </a:lnRef>
+            <a:fillRef idx="1">
+              <a:schemeClr val="accent1"/>
+            </a:fillRef>
+            <a:effectRef idx="0">
+              <a:schemeClr val="accent1"/>
+            </a:effectRef>
+            <a:fontRef idx="minor">
+              <a:schemeClr val="lt1"/>
+            </a:fontRef>
+          </p:style>
+          <p:txBody>
+            <a:bodyPr rtlCol="0" anchor="ctr"/>
+            <a:lstStyle/>
+            <a:p>
+              <a:pPr algn="ctr"/>
+              <a:endParaRPr lang="zh-CN" altLang="en-US"/>
+            </a:p>
+          </p:txBody>
+        </p:sp>
+        <p:graphicFrame>
+          <p:nvGraphicFramePr>
+            <p:cNvPr id="60" name="对象 59">
+              <a:extLst>
+                <a:ext uri="{FF2B5EF4-FFF2-40B4-BE49-F238E27FC236}">
+                  <a16:creationId xmlns:a16="http://schemas.microsoft.com/office/drawing/2014/main" id="{1946CD62-30CA-4961-A25F-D2D22F435B5E}"/>
+                </a:ext>
+              </a:extLst>
+            </p:cNvPr>
+            <p:cNvGraphicFramePr>
+              <a:graphicFrameLocks noChangeAspect="1"/>
+            </p:cNvGraphicFramePr>
+            <p:nvPr>
+              <p:extLst>
+                <p:ext uri="{D42A27DB-BD31-4B8C-83A1-F6EECF244321}">
+                  <p14:modId xmlns:p14="http://schemas.microsoft.com/office/powerpoint/2010/main" val="2084356763"/>
+                </p:ext>
+              </p:extLst>
+            </p:nvPr>
+          </p:nvGraphicFramePr>
+          <p:xfrm>
+            <a:off x="5773659" y="1206896"/>
+            <a:ext cx="165100" cy="165100"/>
+          </p:xfrm>
+          <a:graphic>
+            <a:graphicData uri="http://schemas.openxmlformats.org/presentationml/2006/ole">
+              <mc:AlternateContent xmlns:mc="http://schemas.openxmlformats.org/markup-compatibility/2006">
+                <mc:Choice xmlns:v="urn:schemas-microsoft-com:vml" Requires="v">
+                  <p:oleObj spid="_x0000_s1178" name="Equation" r:id="rId37" imgW="164880" imgH="164880" progId="Equation.DSMT4">
+                    <p:embed/>
+                  </p:oleObj>
+                </mc:Choice>
+                <mc:Fallback>
+                  <p:oleObj name="Equation" r:id="rId37" imgW="164880" imgH="164880" progId="Equation.DSMT4">
+                    <p:embed/>
+                    <p:pic>
+                      <p:nvPicPr>
+                        <p:cNvPr id="31" name="对象 30">
+                          <a:extLst>
+                            <a:ext uri="{FF2B5EF4-FFF2-40B4-BE49-F238E27FC236}">
+                              <a16:creationId xmlns:a16="http://schemas.microsoft.com/office/drawing/2014/main" id="{A2BAB0E6-B57C-409F-BC42-D7FBD7E68C01}"/>
+                            </a:ext>
+                          </a:extLst>
+                        </p:cNvPr>
+                        <p:cNvPicPr/>
+                        <p:nvPr/>
+                      </p:nvPicPr>
+                      <p:blipFill>
+                        <a:blip r:embed="rId38"/>
+                        <a:stretch>
+                          <a:fillRect/>
+                        </a:stretch>
+                      </p:blipFill>
+                      <p:spPr>
+                        <a:xfrm>
+                          <a:off x="5773659" y="1206896"/>
+                          <a:ext cx="165100" cy="165100"/>
+                        </a:xfrm>
+                        <a:prstGeom prst="rect">
+                          <a:avLst/>
+                        </a:prstGeom>
+                      </p:spPr>
+                    </p:pic>
+                  </p:oleObj>
+                </mc:Fallback>
+              </mc:AlternateContent>
+            </a:graphicData>
+          </a:graphic>
+        </p:graphicFrame>
+        <p:graphicFrame>
+          <p:nvGraphicFramePr>
+            <p:cNvPr id="61" name="对象 60">
+              <a:extLst>
+                <a:ext uri="{FF2B5EF4-FFF2-40B4-BE49-F238E27FC236}">
+                  <a16:creationId xmlns:a16="http://schemas.microsoft.com/office/drawing/2014/main" id="{D554EF8C-C5AD-469F-B12F-CF28683D1BFA}"/>
+                </a:ext>
+              </a:extLst>
+            </p:cNvPr>
+            <p:cNvGraphicFramePr>
+              <a:graphicFrameLocks noChangeAspect="1"/>
+            </p:cNvGraphicFramePr>
+            <p:nvPr>
+              <p:extLst>
+                <p:ext uri="{D42A27DB-BD31-4B8C-83A1-F6EECF244321}">
+                  <p14:modId xmlns:p14="http://schemas.microsoft.com/office/powerpoint/2010/main" val="3174605272"/>
+                </p:ext>
+              </p:extLst>
+            </p:nvPr>
+          </p:nvGraphicFramePr>
+          <p:xfrm>
+            <a:off x="5773659" y="1493938"/>
+            <a:ext cx="165100" cy="114300"/>
+          </p:xfrm>
+          <a:graphic>
+            <a:graphicData uri="http://schemas.openxmlformats.org/presentationml/2006/ole">
+              <mc:AlternateContent xmlns:mc="http://schemas.openxmlformats.org/markup-compatibility/2006">
+                <mc:Choice xmlns:v="urn:schemas-microsoft-com:vml" Requires="v">
+                  <p:oleObj spid="_x0000_s1179" name="Equation" r:id="rId39" imgW="164880" imgH="114120" progId="Equation.DSMT4">
+                    <p:embed/>
+                  </p:oleObj>
+                </mc:Choice>
+                <mc:Fallback>
+                  <p:oleObj name="Equation" r:id="rId39" imgW="164880" imgH="114120" progId="Equation.DSMT4">
+                    <p:embed/>
+                    <p:pic>
+                      <p:nvPicPr>
+                        <p:cNvPr id="32" name="对象 31">
+                          <a:extLst>
+                            <a:ext uri="{FF2B5EF4-FFF2-40B4-BE49-F238E27FC236}">
+                              <a16:creationId xmlns:a16="http://schemas.microsoft.com/office/drawing/2014/main" id="{025656FA-49DE-41D5-961B-8BF065A3EACC}"/>
+                            </a:ext>
+                          </a:extLst>
+                        </p:cNvPr>
+                        <p:cNvPicPr/>
+                        <p:nvPr/>
+                      </p:nvPicPr>
+                      <p:blipFill>
+                        <a:blip r:embed="rId12"/>
+                        <a:stretch>
+                          <a:fillRect/>
+                        </a:stretch>
+                      </p:blipFill>
+                      <p:spPr>
+                        <a:xfrm>
+                          <a:off x="5773659" y="1493938"/>
+                          <a:ext cx="165100" cy="114300"/>
+                        </a:xfrm>
+                        <a:prstGeom prst="rect">
+                          <a:avLst/>
+                        </a:prstGeom>
+                      </p:spPr>
+                    </p:pic>
+                  </p:oleObj>
+                </mc:Fallback>
+              </mc:AlternateContent>
+            </a:graphicData>
+          </a:graphic>
+        </p:graphicFrame>
+        <p:graphicFrame>
+          <p:nvGraphicFramePr>
+            <p:cNvPr id="62" name="对象 61">
+              <a:extLst>
+                <a:ext uri="{FF2B5EF4-FFF2-40B4-BE49-F238E27FC236}">
+                  <a16:creationId xmlns:a16="http://schemas.microsoft.com/office/drawing/2014/main" id="{51952470-E486-4530-BBF0-670A64521A8F}"/>
+                </a:ext>
+              </a:extLst>
+            </p:cNvPr>
+            <p:cNvGraphicFramePr>
+              <a:graphicFrameLocks noChangeAspect="1"/>
+            </p:cNvGraphicFramePr>
+            <p:nvPr>
+              <p:extLst>
+                <p:ext uri="{D42A27DB-BD31-4B8C-83A1-F6EECF244321}">
+                  <p14:modId xmlns:p14="http://schemas.microsoft.com/office/powerpoint/2010/main" val="2421444808"/>
+                </p:ext>
+              </p:extLst>
+            </p:nvPr>
+          </p:nvGraphicFramePr>
+          <p:xfrm>
+            <a:off x="5513309" y="1691084"/>
+            <a:ext cx="685800" cy="215900"/>
+          </p:xfrm>
+          <a:graphic>
+            <a:graphicData uri="http://schemas.openxmlformats.org/presentationml/2006/ole">
+              <mc:AlternateContent xmlns:mc="http://schemas.openxmlformats.org/markup-compatibility/2006">
+                <mc:Choice xmlns:v="urn:schemas-microsoft-com:vml" Requires="v">
+                  <p:oleObj spid="_x0000_s1180" name="Equation" r:id="rId40" imgW="685800" imgH="215640" progId="Equation.DSMT4">
+                    <p:embed/>
+                  </p:oleObj>
+                </mc:Choice>
+                <mc:Fallback>
+                  <p:oleObj name="Equation" r:id="rId40" imgW="685800" imgH="215640" progId="Equation.DSMT4">
+                    <p:embed/>
+                    <p:pic>
+                      <p:nvPicPr>
+                        <p:cNvPr id="33" name="对象 32">
+                          <a:extLst>
+                            <a:ext uri="{FF2B5EF4-FFF2-40B4-BE49-F238E27FC236}">
+                              <a16:creationId xmlns:a16="http://schemas.microsoft.com/office/drawing/2014/main" id="{FCFE96D5-C5B0-428F-BA79-46AB23BEA7E7}"/>
+                            </a:ext>
+                          </a:extLst>
+                        </p:cNvPr>
+                        <p:cNvPicPr/>
+                        <p:nvPr/>
+                      </p:nvPicPr>
+                      <p:blipFill>
+                        <a:blip r:embed="rId41"/>
+                        <a:stretch>
+                          <a:fillRect/>
+                        </a:stretch>
+                      </p:blipFill>
+                      <p:spPr>
+                        <a:xfrm>
+                          <a:off x="5513309" y="1691084"/>
+                          <a:ext cx="685800" cy="215900"/>
+                        </a:xfrm>
+                        <a:prstGeom prst="rect">
+                          <a:avLst/>
+                        </a:prstGeom>
+                      </p:spPr>
+                    </p:pic>
+                  </p:oleObj>
+                </mc:Fallback>
+              </mc:AlternateContent>
+            </a:graphicData>
+          </a:graphic>
+        </p:graphicFrame>
+      </p:grpSp>
+      <p:grpSp>
+        <p:nvGrpSpPr>
+          <p:cNvPr id="99" name="组合 98">
+            <a:extLst>
+              <a:ext uri="{FF2B5EF4-FFF2-40B4-BE49-F238E27FC236}">
+                <a16:creationId xmlns:a16="http://schemas.microsoft.com/office/drawing/2014/main" id="{72C5F55B-62F9-4907-9BA9-B195F8A7BC70}"/>
+              </a:ext>
+            </a:extLst>
+          </p:cNvPr>
+          <p:cNvGrpSpPr/>
+          <p:nvPr/>
+        </p:nvGrpSpPr>
+        <p:grpSpPr>
+          <a:xfrm>
+            <a:off x="5381229" y="2881243"/>
+            <a:ext cx="949960" cy="843280"/>
+            <a:chOff x="5381229" y="2881243"/>
+            <a:chExt cx="949960" cy="843280"/>
+          </a:xfrm>
+        </p:grpSpPr>
+        <p:sp>
+          <p:nvSpPr>
+            <p:cNvPr id="64" name="椭圆 63">
+              <a:extLst>
+                <a:ext uri="{FF2B5EF4-FFF2-40B4-BE49-F238E27FC236}">
+                  <a16:creationId xmlns:a16="http://schemas.microsoft.com/office/drawing/2014/main" id="{EC821DA0-FED9-412E-8244-DDD65C775F61}"/>
+                </a:ext>
+              </a:extLst>
+            </p:cNvPr>
+            <p:cNvSpPr>
+              <a:spLocks/>
+            </p:cNvSpPr>
+            <p:nvPr/>
+          </p:nvSpPr>
+          <p:spPr>
+            <a:xfrm>
+              <a:off x="5381229" y="2881243"/>
+              <a:ext cx="949960" cy="843280"/>
+            </a:xfrm>
+            <a:prstGeom prst="ellipse">
+              <a:avLst/>
+            </a:prstGeom>
+            <a:noFill/>
+            <a:ln w="25400">
+              <a:solidFill>
+                <a:srgbClr val="E41A1C"/>
+              </a:solidFill>
+            </a:ln>
+          </p:spPr>
+          <p:style>
+            <a:lnRef idx="2">
+              <a:schemeClr val="accent1">
+                <a:shade val="50000"/>
+              </a:schemeClr>
+            </a:lnRef>
+            <a:fillRef idx="1">
+              <a:schemeClr val="accent1"/>
+            </a:fillRef>
+            <a:effectRef idx="0">
+              <a:schemeClr val="accent1"/>
+            </a:effectRef>
+            <a:fontRef idx="minor">
+              <a:schemeClr val="lt1"/>
+            </a:fontRef>
+          </p:style>
+          <p:txBody>
+            <a:bodyPr rtlCol="0" anchor="ctr"/>
+            <a:lstStyle/>
+            <a:p>
+              <a:pPr algn="ctr"/>
+              <a:endParaRPr lang="zh-CN" altLang="en-US"/>
+            </a:p>
+          </p:txBody>
+        </p:sp>
+        <p:graphicFrame>
+          <p:nvGraphicFramePr>
+            <p:cNvPr id="65" name="对象 64">
+              <a:extLst>
+                <a:ext uri="{FF2B5EF4-FFF2-40B4-BE49-F238E27FC236}">
+                  <a16:creationId xmlns:a16="http://schemas.microsoft.com/office/drawing/2014/main" id="{3CCCEC5A-C4B5-4A28-99DE-0996F67E52D0}"/>
+                </a:ext>
+              </a:extLst>
+            </p:cNvPr>
+            <p:cNvGraphicFramePr>
+              <a:graphicFrameLocks noChangeAspect="1"/>
+            </p:cNvGraphicFramePr>
+            <p:nvPr>
+              <p:extLst>
+                <p:ext uri="{D42A27DB-BD31-4B8C-83A1-F6EECF244321}">
+                  <p14:modId xmlns:p14="http://schemas.microsoft.com/office/powerpoint/2010/main" val="3864286278"/>
+                </p:ext>
+              </p:extLst>
+            </p:nvPr>
+          </p:nvGraphicFramePr>
+          <p:xfrm>
+            <a:off x="5779454" y="2922588"/>
+            <a:ext cx="152400" cy="165100"/>
+          </p:xfrm>
+          <a:graphic>
+            <a:graphicData uri="http://schemas.openxmlformats.org/presentationml/2006/ole">
+              <mc:AlternateContent xmlns:mc="http://schemas.openxmlformats.org/markup-compatibility/2006">
+                <mc:Choice xmlns:v="urn:schemas-microsoft-com:vml" Requires="v">
+                  <p:oleObj spid="_x0000_s1181" name="Equation" r:id="rId42" imgW="152280" imgH="164880" progId="Equation.DSMT4">
+                    <p:embed/>
+                  </p:oleObj>
+                </mc:Choice>
+                <mc:Fallback>
+                  <p:oleObj name="Equation" r:id="rId42" imgW="152280" imgH="164880" progId="Equation.DSMT4">
+                    <p:embed/>
+                    <p:pic>
+                      <p:nvPicPr>
+                        <p:cNvPr id="60" name="对象 59">
+                          <a:extLst>
+                            <a:ext uri="{FF2B5EF4-FFF2-40B4-BE49-F238E27FC236}">
+                              <a16:creationId xmlns:a16="http://schemas.microsoft.com/office/drawing/2014/main" id="{1946CD62-30CA-4961-A25F-D2D22F435B5E}"/>
+                            </a:ext>
+                          </a:extLst>
+                        </p:cNvPr>
+                        <p:cNvPicPr/>
+                        <p:nvPr/>
+                      </p:nvPicPr>
+                      <p:blipFill>
+                        <a:blip r:embed="rId43"/>
+                        <a:stretch>
+                          <a:fillRect/>
+                        </a:stretch>
+                      </p:blipFill>
+                      <p:spPr>
+                        <a:xfrm>
+                          <a:off x="5779454" y="2922588"/>
+                          <a:ext cx="152400" cy="165100"/>
+                        </a:xfrm>
+                        <a:prstGeom prst="rect">
+                          <a:avLst/>
+                        </a:prstGeom>
+                      </p:spPr>
+                    </p:pic>
+                  </p:oleObj>
+                </mc:Fallback>
+              </mc:AlternateContent>
+            </a:graphicData>
+          </a:graphic>
+        </p:graphicFrame>
+        <p:graphicFrame>
+          <p:nvGraphicFramePr>
+            <p:cNvPr id="66" name="对象 65">
+              <a:extLst>
+                <a:ext uri="{FF2B5EF4-FFF2-40B4-BE49-F238E27FC236}">
+                  <a16:creationId xmlns:a16="http://schemas.microsoft.com/office/drawing/2014/main" id="{E6560AB3-FB40-4AD8-AB9D-F1380E65B0CB}"/>
+                </a:ext>
+              </a:extLst>
+            </p:cNvPr>
+            <p:cNvGraphicFramePr>
+              <a:graphicFrameLocks noChangeAspect="1"/>
+            </p:cNvGraphicFramePr>
+            <p:nvPr>
+              <p:extLst>
+                <p:ext uri="{D42A27DB-BD31-4B8C-83A1-F6EECF244321}">
+                  <p14:modId xmlns:p14="http://schemas.microsoft.com/office/powerpoint/2010/main" val="21667892"/>
+                </p:ext>
+              </p:extLst>
+            </p:nvPr>
+          </p:nvGraphicFramePr>
+          <p:xfrm>
+            <a:off x="5773659" y="3208903"/>
+            <a:ext cx="165100" cy="114300"/>
+          </p:xfrm>
+          <a:graphic>
+            <a:graphicData uri="http://schemas.openxmlformats.org/presentationml/2006/ole">
+              <mc:AlternateContent xmlns:mc="http://schemas.openxmlformats.org/markup-compatibility/2006">
+                <mc:Choice xmlns:v="urn:schemas-microsoft-com:vml" Requires="v">
+                  <p:oleObj spid="_x0000_s1182" name="Equation" r:id="rId44" imgW="164880" imgH="114120" progId="Equation.DSMT4">
+                    <p:embed/>
+                  </p:oleObj>
+                </mc:Choice>
+                <mc:Fallback>
+                  <p:oleObj name="Equation" r:id="rId44" imgW="164880" imgH="114120" progId="Equation.DSMT4">
+                    <p:embed/>
+                    <p:pic>
+                      <p:nvPicPr>
+                        <p:cNvPr id="61" name="对象 60">
+                          <a:extLst>
+                            <a:ext uri="{FF2B5EF4-FFF2-40B4-BE49-F238E27FC236}">
+                              <a16:creationId xmlns:a16="http://schemas.microsoft.com/office/drawing/2014/main" id="{D554EF8C-C5AD-469F-B12F-CF28683D1BFA}"/>
+                            </a:ext>
+                          </a:extLst>
+                        </p:cNvPr>
+                        <p:cNvPicPr/>
+                        <p:nvPr/>
+                      </p:nvPicPr>
+                      <p:blipFill>
+                        <a:blip r:embed="rId12"/>
+                        <a:stretch>
+                          <a:fillRect/>
+                        </a:stretch>
+                      </p:blipFill>
+                      <p:spPr>
+                        <a:xfrm>
+                          <a:off x="5773659" y="3208903"/>
+                          <a:ext cx="165100" cy="114300"/>
+                        </a:xfrm>
+                        <a:prstGeom prst="rect">
+                          <a:avLst/>
+                        </a:prstGeom>
+                      </p:spPr>
+                    </p:pic>
+                  </p:oleObj>
+                </mc:Fallback>
+              </mc:AlternateContent>
+            </a:graphicData>
+          </a:graphic>
+        </p:graphicFrame>
+        <p:graphicFrame>
+          <p:nvGraphicFramePr>
+            <p:cNvPr id="67" name="对象 66">
+              <a:extLst>
+                <a:ext uri="{FF2B5EF4-FFF2-40B4-BE49-F238E27FC236}">
+                  <a16:creationId xmlns:a16="http://schemas.microsoft.com/office/drawing/2014/main" id="{6D18E743-8D8A-4EDD-AB76-391F7987AE8F}"/>
+                </a:ext>
+              </a:extLst>
+            </p:cNvPr>
+            <p:cNvGraphicFramePr>
+              <a:graphicFrameLocks noChangeAspect="1"/>
+            </p:cNvGraphicFramePr>
+            <p:nvPr>
+              <p:extLst>
+                <p:ext uri="{D42A27DB-BD31-4B8C-83A1-F6EECF244321}">
+                  <p14:modId xmlns:p14="http://schemas.microsoft.com/office/powerpoint/2010/main" val="2228555355"/>
+                </p:ext>
+              </p:extLst>
+            </p:nvPr>
+          </p:nvGraphicFramePr>
+          <p:xfrm>
+            <a:off x="5513309" y="3406049"/>
+            <a:ext cx="685800" cy="215900"/>
+          </p:xfrm>
+          <a:graphic>
+            <a:graphicData uri="http://schemas.openxmlformats.org/presentationml/2006/ole">
+              <mc:AlternateContent xmlns:mc="http://schemas.openxmlformats.org/markup-compatibility/2006">
+                <mc:Choice xmlns:v="urn:schemas-microsoft-com:vml" Requires="v">
+                  <p:oleObj spid="_x0000_s1183" name="Equation" r:id="rId45" imgW="685800" imgH="215640" progId="Equation.DSMT4">
+                    <p:embed/>
+                  </p:oleObj>
+                </mc:Choice>
+                <mc:Fallback>
+                  <p:oleObj name="Equation" r:id="rId45" imgW="685800" imgH="215640" progId="Equation.DSMT4">
+                    <p:embed/>
+                    <p:pic>
+                      <p:nvPicPr>
+                        <p:cNvPr id="62" name="对象 61">
+                          <a:extLst>
+                            <a:ext uri="{FF2B5EF4-FFF2-40B4-BE49-F238E27FC236}">
+                              <a16:creationId xmlns:a16="http://schemas.microsoft.com/office/drawing/2014/main" id="{51952470-E486-4530-BBF0-670A64521A8F}"/>
+                            </a:ext>
+                          </a:extLst>
+                        </p:cNvPr>
+                        <p:cNvPicPr/>
+                        <p:nvPr/>
+                      </p:nvPicPr>
+                      <p:blipFill>
+                        <a:blip r:embed="rId46"/>
+                        <a:stretch>
+                          <a:fillRect/>
+                        </a:stretch>
+                      </p:blipFill>
+                      <p:spPr>
+                        <a:xfrm>
+                          <a:off x="5513309" y="3406049"/>
+                          <a:ext cx="685800" cy="215900"/>
+                        </a:xfrm>
+                        <a:prstGeom prst="rect">
+                          <a:avLst/>
+                        </a:prstGeom>
+                      </p:spPr>
+                    </p:pic>
+                  </p:oleObj>
+                </mc:Fallback>
+              </mc:AlternateContent>
+            </a:graphicData>
+          </a:graphic>
+        </p:graphicFrame>
+      </p:grpSp>
+      <p:cxnSp>
+        <p:nvCxnSpPr>
+          <p:cNvPr id="69" name="直接箭头连接符 68">
+            <a:extLst>
+              <a:ext uri="{FF2B5EF4-FFF2-40B4-BE49-F238E27FC236}">
+                <a16:creationId xmlns:a16="http://schemas.microsoft.com/office/drawing/2014/main" id="{FE88C088-894D-49C0-AA50-1BC68593B252}"/>
+              </a:ext>
+            </a:extLst>
+          </p:cNvPr>
+          <p:cNvCxnSpPr>
+            <a:cxnSpLocks/>
+            <a:stCxn id="36" idx="4"/>
+            <a:endCxn id="43" idx="0"/>
+          </p:cNvCxnSpPr>
+          <p:nvPr/>
+        </p:nvCxnSpPr>
+        <p:spPr>
+          <a:xfrm flipH="1">
+            <a:off x="3506788" y="1483844"/>
+            <a:ext cx="3810" cy="496702"/>
+          </a:xfrm>
+          <a:prstGeom prst="straightConnector1">
+            <a:avLst/>
+          </a:prstGeom>
+          <a:ln w="19050">
+            <a:solidFill>
+              <a:schemeClr val="accent3">
+                <a:lumMod val="75000"/>
+              </a:schemeClr>
+            </a:solidFill>
+            <a:headEnd type="none" w="med" len="med"/>
+            <a:tailEnd type="arrow" w="med" len="med"/>
+          </a:ln>
+        </p:spPr>
+        <p:style>
+          <a:lnRef idx="1">
+            <a:schemeClr val="accent1"/>
+          </a:lnRef>
+          <a:fillRef idx="0">
+            <a:schemeClr val="accent1"/>
+          </a:fillRef>
+          <a:effectRef idx="0">
+            <a:schemeClr val="accent1"/>
+          </a:effectRef>
+          <a:fontRef idx="minor">
+            <a:schemeClr val="tx1"/>
+          </a:fontRef>
+        </p:style>
+      </p:cxnSp>
+      <p:cxnSp>
+        <p:nvCxnSpPr>
+          <p:cNvPr id="71" name="直接箭头连接符 70">
+            <a:extLst>
+              <a:ext uri="{FF2B5EF4-FFF2-40B4-BE49-F238E27FC236}">
+                <a16:creationId xmlns:a16="http://schemas.microsoft.com/office/drawing/2014/main" id="{B88A0CD3-DAB3-433E-84A9-2EEDDDDF4E3C}"/>
+              </a:ext>
+            </a:extLst>
+          </p:cNvPr>
+          <p:cNvCxnSpPr>
+            <a:cxnSpLocks/>
+            <a:stCxn id="42" idx="4"/>
+            <a:endCxn id="47" idx="0"/>
+          </p:cNvCxnSpPr>
+          <p:nvPr/>
+        </p:nvCxnSpPr>
+        <p:spPr>
+          <a:xfrm>
+            <a:off x="3510598" y="2900144"/>
+            <a:ext cx="0" cy="496702"/>
+          </a:xfrm>
+          <a:prstGeom prst="straightConnector1">
+            <a:avLst/>
+          </a:prstGeom>
+          <a:ln w="19050">
+            <a:solidFill>
+              <a:schemeClr val="accent3">
+                <a:lumMod val="75000"/>
+              </a:schemeClr>
+            </a:solidFill>
+            <a:headEnd type="none" w="med" len="med"/>
+            <a:tailEnd type="arrow" w="med" len="med"/>
+          </a:ln>
+        </p:spPr>
+        <p:style>
+          <a:lnRef idx="1">
+            <a:schemeClr val="accent1"/>
+          </a:lnRef>
+          <a:fillRef idx="0">
+            <a:schemeClr val="accent1"/>
+          </a:fillRef>
+          <a:effectRef idx="0">
+            <a:schemeClr val="accent1"/>
+          </a:effectRef>
+          <a:fontRef idx="minor">
+            <a:schemeClr val="tx1"/>
+          </a:fontRef>
+        </p:style>
+      </p:cxnSp>
+      <p:cxnSp>
+        <p:nvCxnSpPr>
+          <p:cNvPr id="75" name="直接箭头连接符 74">
+            <a:extLst>
+              <a:ext uri="{FF2B5EF4-FFF2-40B4-BE49-F238E27FC236}">
+                <a16:creationId xmlns:a16="http://schemas.microsoft.com/office/drawing/2014/main" id="{0AB7074F-487C-466B-B535-E1E40F5AA725}"/>
+              </a:ext>
+            </a:extLst>
+          </p:cNvPr>
+          <p:cNvCxnSpPr>
+            <a:cxnSpLocks/>
+            <a:stCxn id="47" idx="4"/>
+            <a:endCxn id="52" idx="0"/>
+          </p:cNvCxnSpPr>
+          <p:nvPr/>
+        </p:nvCxnSpPr>
+        <p:spPr>
+          <a:xfrm>
+            <a:off x="3510598" y="4300723"/>
+            <a:ext cx="0" cy="513023"/>
+          </a:xfrm>
+          <a:prstGeom prst="straightConnector1">
+            <a:avLst/>
+          </a:prstGeom>
+          <a:ln w="19050">
+            <a:solidFill>
+              <a:schemeClr val="accent3">
+                <a:lumMod val="75000"/>
+              </a:schemeClr>
+            </a:solidFill>
+            <a:headEnd type="none" w="med" len="med"/>
+            <a:tailEnd type="arrow" w="med" len="med"/>
+          </a:ln>
+        </p:spPr>
+        <p:style>
+          <a:lnRef idx="1">
+            <a:schemeClr val="accent1"/>
+          </a:lnRef>
+          <a:fillRef idx="0">
+            <a:schemeClr val="accent1"/>
+          </a:fillRef>
+          <a:effectRef idx="0">
+            <a:schemeClr val="accent1"/>
+          </a:effectRef>
+          <a:fontRef idx="minor">
+            <a:schemeClr val="tx1"/>
+          </a:fontRef>
+        </p:style>
+      </p:cxnSp>
+      <p:cxnSp>
+        <p:nvCxnSpPr>
+          <p:cNvPr id="77" name="直接箭头连接符 76">
+            <a:extLst>
+              <a:ext uri="{FF2B5EF4-FFF2-40B4-BE49-F238E27FC236}">
+                <a16:creationId xmlns:a16="http://schemas.microsoft.com/office/drawing/2014/main" id="{4E74D707-8B52-4644-BB3C-BDF67AC8C024}"/>
+              </a:ext>
+            </a:extLst>
+          </p:cNvPr>
+          <p:cNvCxnSpPr>
+            <a:stCxn id="36" idx="5"/>
+            <a:endCxn id="64" idx="1"/>
+          </p:cNvCxnSpPr>
+          <p:nvPr/>
+        </p:nvCxnSpPr>
+        <p:spPr>
+          <a:xfrm>
+            <a:off x="3870594" y="1351474"/>
+            <a:ext cx="1649753" cy="1653264"/>
+          </a:xfrm>
+          <a:prstGeom prst="straightConnector1">
+            <a:avLst/>
+          </a:prstGeom>
+          <a:ln w="19050">
+            <a:solidFill>
+              <a:schemeClr val="accent3">
+                <a:lumMod val="75000"/>
+              </a:schemeClr>
+            </a:solidFill>
+            <a:headEnd type="none" w="med" len="med"/>
+            <a:tailEnd type="arrow" w="med" len="med"/>
+          </a:ln>
+        </p:spPr>
+        <p:style>
+          <a:lnRef idx="1">
+            <a:schemeClr val="accent1"/>
+          </a:lnRef>
+          <a:fillRef idx="0">
+            <a:schemeClr val="accent1"/>
+          </a:fillRef>
+          <a:effectRef idx="0">
+            <a:schemeClr val="accent1"/>
+          </a:effectRef>
+          <a:fontRef idx="minor">
+            <a:schemeClr val="tx1"/>
+          </a:fontRef>
+        </p:style>
+      </p:cxnSp>
+      <p:cxnSp>
+        <p:nvCxnSpPr>
+          <p:cNvPr id="79" name="直接箭头连接符 78">
+            <a:extLst>
+              <a:ext uri="{FF2B5EF4-FFF2-40B4-BE49-F238E27FC236}">
+                <a16:creationId xmlns:a16="http://schemas.microsoft.com/office/drawing/2014/main" id="{C8DF7A0A-DC6F-4634-9617-0D8B5AE9C34F}"/>
+              </a:ext>
+            </a:extLst>
+          </p:cNvPr>
+          <p:cNvCxnSpPr>
+            <a:stCxn id="42" idx="5"/>
+            <a:endCxn id="64" idx="2"/>
+          </p:cNvCxnSpPr>
+          <p:nvPr/>
+        </p:nvCxnSpPr>
+        <p:spPr>
+          <a:xfrm>
+            <a:off x="3870594" y="2767774"/>
+            <a:ext cx="1510635" cy="535109"/>
+          </a:xfrm>
+          <a:prstGeom prst="straightConnector1">
+            <a:avLst/>
+          </a:prstGeom>
+          <a:ln w="19050">
+            <a:solidFill>
+              <a:schemeClr val="accent3">
+                <a:lumMod val="75000"/>
+              </a:schemeClr>
+            </a:solidFill>
+            <a:headEnd type="none" w="med" len="med"/>
+            <a:tailEnd type="arrow" w="med" len="med"/>
+          </a:ln>
+        </p:spPr>
+        <p:style>
+          <a:lnRef idx="1">
+            <a:schemeClr val="accent1"/>
+          </a:lnRef>
+          <a:fillRef idx="0">
+            <a:schemeClr val="accent1"/>
+          </a:fillRef>
+          <a:effectRef idx="0">
+            <a:schemeClr val="accent1"/>
+          </a:effectRef>
+          <a:fontRef idx="minor">
+            <a:schemeClr val="tx1"/>
+          </a:fontRef>
+        </p:style>
+      </p:cxnSp>
+      <p:cxnSp>
+        <p:nvCxnSpPr>
+          <p:cNvPr id="81" name="直接箭头连接符 80">
+            <a:extLst>
+              <a:ext uri="{FF2B5EF4-FFF2-40B4-BE49-F238E27FC236}">
+                <a16:creationId xmlns:a16="http://schemas.microsoft.com/office/drawing/2014/main" id="{823337AC-D7FC-4B50-9859-E70A8EDF42A7}"/>
+              </a:ext>
+            </a:extLst>
+          </p:cNvPr>
+          <p:cNvCxnSpPr>
+            <a:cxnSpLocks/>
+            <a:stCxn id="47" idx="6"/>
+            <a:endCxn id="64" idx="3"/>
+          </p:cNvCxnSpPr>
+          <p:nvPr/>
+        </p:nvCxnSpPr>
+        <p:spPr>
+          <a:xfrm flipV="1">
+            <a:off x="4019709" y="3601028"/>
+            <a:ext cx="1500638" cy="247757"/>
+          </a:xfrm>
+          <a:prstGeom prst="straightConnector1">
+            <a:avLst/>
+          </a:prstGeom>
+          <a:ln w="19050">
+            <a:solidFill>
+              <a:schemeClr val="accent3">
+                <a:lumMod val="75000"/>
+              </a:schemeClr>
+            </a:solidFill>
+            <a:headEnd type="none" w="med" len="med"/>
+            <a:tailEnd type="arrow" w="med" len="med"/>
+          </a:ln>
+        </p:spPr>
+        <p:style>
+          <a:lnRef idx="1">
+            <a:schemeClr val="accent1"/>
+          </a:lnRef>
+          <a:fillRef idx="0">
+            <a:schemeClr val="accent1"/>
+          </a:fillRef>
+          <a:effectRef idx="0">
+            <a:schemeClr val="accent1"/>
+          </a:effectRef>
+          <a:fontRef idx="minor">
+            <a:schemeClr val="tx1"/>
+          </a:fontRef>
+        </p:style>
+      </p:cxnSp>
+      <p:cxnSp>
+        <p:nvCxnSpPr>
+          <p:cNvPr id="83" name="直接箭头连接符 82">
+            <a:extLst>
+              <a:ext uri="{FF2B5EF4-FFF2-40B4-BE49-F238E27FC236}">
+                <a16:creationId xmlns:a16="http://schemas.microsoft.com/office/drawing/2014/main" id="{F8F1D601-E349-4BCC-95FA-809BAD6E00EF}"/>
+              </a:ext>
+            </a:extLst>
+          </p:cNvPr>
+          <p:cNvCxnSpPr>
+            <a:stCxn id="52" idx="6"/>
+            <a:endCxn id="64" idx="4"/>
+          </p:cNvCxnSpPr>
+          <p:nvPr/>
+        </p:nvCxnSpPr>
+        <p:spPr>
+          <a:xfrm flipV="1">
+            <a:off x="4019709" y="3724523"/>
+            <a:ext cx="1836500" cy="1541162"/>
+          </a:xfrm>
+          <a:prstGeom prst="straightConnector1">
+            <a:avLst/>
+          </a:prstGeom>
+          <a:ln w="19050">
+            <a:solidFill>
+              <a:schemeClr val="accent3">
+                <a:lumMod val="75000"/>
+              </a:schemeClr>
+            </a:solidFill>
+            <a:headEnd type="none" w="med" len="med"/>
+            <a:tailEnd type="arrow" w="med" len="med"/>
+          </a:ln>
+        </p:spPr>
+        <p:style>
+          <a:lnRef idx="1">
+            <a:schemeClr val="accent1"/>
+          </a:lnRef>
+          <a:fillRef idx="0">
+            <a:schemeClr val="accent1"/>
+          </a:fillRef>
+          <a:effectRef idx="0">
+            <a:schemeClr val="accent1"/>
+          </a:effectRef>
+          <a:fontRef idx="minor">
+            <a:schemeClr val="tx1"/>
+          </a:fontRef>
+        </p:style>
+      </p:cxnSp>
+      <p:cxnSp>
+        <p:nvCxnSpPr>
+          <p:cNvPr id="85" name="直接箭头连接符 84">
+            <a:extLst>
+              <a:ext uri="{FF2B5EF4-FFF2-40B4-BE49-F238E27FC236}">
+                <a16:creationId xmlns:a16="http://schemas.microsoft.com/office/drawing/2014/main" id="{D7E3E795-E5D4-42F8-BBA9-EB66C0886F96}"/>
+              </a:ext>
+            </a:extLst>
+          </p:cNvPr>
+          <p:cNvCxnSpPr>
+            <a:stCxn id="5" idx="2"/>
+            <a:endCxn id="64" idx="7"/>
+          </p:cNvCxnSpPr>
+          <p:nvPr/>
+        </p:nvCxnSpPr>
+        <p:spPr>
+          <a:xfrm flipH="1">
+            <a:off x="6192071" y="1219412"/>
+            <a:ext cx="1598427" cy="1785326"/>
+          </a:xfrm>
+          <a:prstGeom prst="straightConnector1">
+            <a:avLst/>
+          </a:prstGeom>
+          <a:ln w="19050">
+            <a:solidFill>
+              <a:schemeClr val="accent3">
+                <a:lumMod val="75000"/>
+              </a:schemeClr>
+            </a:solidFill>
+            <a:headEnd type="none" w="med" len="med"/>
+            <a:tailEnd type="arrow" w="med" len="med"/>
+          </a:ln>
+        </p:spPr>
+        <p:style>
+          <a:lnRef idx="1">
+            <a:schemeClr val="accent1"/>
+          </a:lnRef>
+          <a:fillRef idx="0">
+            <a:schemeClr val="accent1"/>
+          </a:fillRef>
+          <a:effectRef idx="0">
+            <a:schemeClr val="accent1"/>
+          </a:effectRef>
+          <a:fontRef idx="minor">
+            <a:schemeClr val="tx1"/>
+          </a:fontRef>
+        </p:style>
+      </p:cxnSp>
+      <p:cxnSp>
+        <p:nvCxnSpPr>
+          <p:cNvPr id="87" name="直接箭头连接符 86">
+            <a:extLst>
+              <a:ext uri="{FF2B5EF4-FFF2-40B4-BE49-F238E27FC236}">
+                <a16:creationId xmlns:a16="http://schemas.microsoft.com/office/drawing/2014/main" id="{BE180768-1875-4DD2-ABC0-DA96E950EB99}"/>
+              </a:ext>
+            </a:extLst>
+          </p:cNvPr>
+          <p:cNvCxnSpPr>
+            <a:stCxn id="20" idx="2"/>
+            <a:endCxn id="64" idx="6"/>
+          </p:cNvCxnSpPr>
+          <p:nvPr/>
+        </p:nvCxnSpPr>
+        <p:spPr>
+          <a:xfrm flipH="1">
+            <a:off x="6331189" y="2542576"/>
+            <a:ext cx="1459309" cy="760307"/>
+          </a:xfrm>
+          <a:prstGeom prst="straightConnector1">
+            <a:avLst/>
+          </a:prstGeom>
+          <a:ln w="19050">
+            <a:solidFill>
+              <a:schemeClr val="accent3">
+                <a:lumMod val="75000"/>
+              </a:schemeClr>
+            </a:solidFill>
+            <a:headEnd type="none" w="med" len="med"/>
+            <a:tailEnd type="arrow" w="med" len="med"/>
+          </a:ln>
+        </p:spPr>
+        <p:style>
+          <a:lnRef idx="1">
+            <a:schemeClr val="accent1"/>
+          </a:lnRef>
+          <a:fillRef idx="0">
+            <a:schemeClr val="accent1"/>
+          </a:fillRef>
+          <a:effectRef idx="0">
+            <a:schemeClr val="accent1"/>
+          </a:effectRef>
+          <a:fontRef idx="minor">
+            <a:schemeClr val="tx1"/>
+          </a:fontRef>
+        </p:style>
+      </p:cxnSp>
+      <p:cxnSp>
+        <p:nvCxnSpPr>
+          <p:cNvPr id="89" name="直接箭头连接符 88">
+            <a:extLst>
+              <a:ext uri="{FF2B5EF4-FFF2-40B4-BE49-F238E27FC236}">
+                <a16:creationId xmlns:a16="http://schemas.microsoft.com/office/drawing/2014/main" id="{AD65765B-9F87-431E-A538-BFAE8F51674B}"/>
+              </a:ext>
+            </a:extLst>
+          </p:cNvPr>
+          <p:cNvCxnSpPr>
+            <a:cxnSpLocks/>
+            <a:stCxn id="25" idx="2"/>
+            <a:endCxn id="64" idx="5"/>
+          </p:cNvCxnSpPr>
+          <p:nvPr/>
+        </p:nvCxnSpPr>
+        <p:spPr>
+          <a:xfrm flipH="1" flipV="1">
+            <a:off x="6192071" y="3601028"/>
+            <a:ext cx="1598427" cy="248625"/>
+          </a:xfrm>
+          <a:prstGeom prst="straightConnector1">
+            <a:avLst/>
+          </a:prstGeom>
+          <a:ln w="19050">
+            <a:solidFill>
+              <a:schemeClr val="accent3">
+                <a:lumMod val="75000"/>
+              </a:schemeClr>
+            </a:solidFill>
+            <a:headEnd type="none" w="med" len="med"/>
+            <a:tailEnd type="arrow" w="med" len="med"/>
+          </a:ln>
+        </p:spPr>
+        <p:style>
+          <a:lnRef idx="1">
+            <a:schemeClr val="accent1"/>
+          </a:lnRef>
+          <a:fillRef idx="0">
+            <a:schemeClr val="accent1"/>
+          </a:fillRef>
+          <a:effectRef idx="0">
+            <a:schemeClr val="accent1"/>
+          </a:effectRef>
+          <a:fontRef idx="minor">
+            <a:schemeClr val="tx1"/>
+          </a:fontRef>
+        </p:style>
+      </p:cxnSp>
+      <p:cxnSp>
+        <p:nvCxnSpPr>
+          <p:cNvPr id="91" name="直接箭头连接符 90">
+            <a:extLst>
+              <a:ext uri="{FF2B5EF4-FFF2-40B4-BE49-F238E27FC236}">
+                <a16:creationId xmlns:a16="http://schemas.microsoft.com/office/drawing/2014/main" id="{1A30FE00-A421-4372-8530-A09E595FDAB6}"/>
+              </a:ext>
+            </a:extLst>
+          </p:cNvPr>
+          <p:cNvCxnSpPr>
+            <a:stCxn id="30" idx="2"/>
+          </p:cNvCxnSpPr>
+          <p:nvPr/>
+        </p:nvCxnSpPr>
+        <p:spPr>
+          <a:xfrm flipH="1" flipV="1">
+            <a:off x="6012074" y="3704194"/>
+            <a:ext cx="1778424" cy="1468622"/>
+          </a:xfrm>
+          <a:prstGeom prst="straightConnector1">
+            <a:avLst/>
+          </a:prstGeom>
+          <a:ln w="19050">
+            <a:solidFill>
+              <a:schemeClr val="accent3">
+                <a:lumMod val="75000"/>
+              </a:schemeClr>
+            </a:solidFill>
+            <a:headEnd type="none" w="med" len="med"/>
+            <a:tailEnd type="arrow" w="med" len="med"/>
+          </a:ln>
+        </p:spPr>
+        <p:style>
+          <a:lnRef idx="1">
+            <a:schemeClr val="accent1"/>
+          </a:lnRef>
+          <a:fillRef idx="0">
+            <a:schemeClr val="accent1"/>
+          </a:fillRef>
+          <a:effectRef idx="0">
+            <a:schemeClr val="accent1"/>
+          </a:effectRef>
+          <a:fontRef idx="minor">
+            <a:schemeClr val="tx1"/>
+          </a:fontRef>
+        </p:style>
+      </p:cxnSp>
+      <p:cxnSp>
+        <p:nvCxnSpPr>
+          <p:cNvPr id="93" name="直接箭头连接符 92">
+            <a:extLst>
+              <a:ext uri="{FF2B5EF4-FFF2-40B4-BE49-F238E27FC236}">
+                <a16:creationId xmlns:a16="http://schemas.microsoft.com/office/drawing/2014/main" id="{59CE88ED-8EE2-409B-ADA2-A042DCD8F285}"/>
+              </a:ext>
+            </a:extLst>
+          </p:cNvPr>
+          <p:cNvCxnSpPr>
+            <a:stCxn id="59" idx="4"/>
+            <a:endCxn id="64" idx="0"/>
+          </p:cNvCxnSpPr>
+          <p:nvPr/>
+        </p:nvCxnSpPr>
+        <p:spPr>
+          <a:xfrm>
+            <a:off x="5856209" y="2009558"/>
+            <a:ext cx="0" cy="871685"/>
+          </a:xfrm>
+          <a:prstGeom prst="straightConnector1">
+            <a:avLst/>
+          </a:prstGeom>
+          <a:ln w="19050">
+            <a:solidFill>
+              <a:schemeClr val="accent3">
+                <a:lumMod val="75000"/>
+              </a:schemeClr>
+            </a:solidFill>
+            <a:headEnd type="none" w="med" len="med"/>
+            <a:tailEnd type="arrow" w="med" len="med"/>
+          </a:ln>
+        </p:spPr>
+        <p:style>
+          <a:lnRef idx="1">
+            <a:schemeClr val="accent1"/>
+          </a:lnRef>
+          <a:fillRef idx="0">
+            <a:schemeClr val="accent1"/>
+          </a:fillRef>
+          <a:effectRef idx="0">
+            <a:schemeClr val="accent1"/>
+          </a:effectRef>
+          <a:fontRef idx="minor">
+            <a:schemeClr val="tx1"/>
+          </a:fontRef>
+        </p:style>
+      </p:cxnSp>
     </p:spTree>
     <p:extLst>
       <p:ext uri="{BB962C8B-B14F-4D97-AF65-F5344CB8AC3E}">

</xml_diff>